<commit_message>
Ajout Schema et brochage / Voiture Autonome version nRF24
</commit_message>
<xml_diff>
--- a/Maquettes/Elec_Num_Emb/Robot_Holonome/brochages.pptx
+++ b/Maquettes/Elec_Num_Emb/Robot_Holonome/brochages.pptx
@@ -201,7 +201,7 @@
           <a:p>
             <a:fld id="{DAC67291-13FB-4A85-9B62-8BED92F848C0}" type="datetimeFigureOut">
               <a:rPr lang="fr-FR" smtClean="0"/>
-              <a:t>05/02/2023</a:t>
+              <a:t>11/02/2023</a:t>
             </a:fld>
             <a:endParaRPr lang="fr-FR"/>
           </a:p>
@@ -699,7 +699,7 @@
           <a:p>
             <a:fld id="{9F9D7BD0-09ED-4241-9B50-84DC221E5746}" type="datetimeFigureOut">
               <a:rPr lang="fr-FR" smtClean="0"/>
-              <a:t>05/02/2023</a:t>
+              <a:t>11/02/2023</a:t>
             </a:fld>
             <a:endParaRPr lang="fr-FR"/>
           </a:p>
@@ -897,7 +897,7 @@
           <a:p>
             <a:fld id="{9F9D7BD0-09ED-4241-9B50-84DC221E5746}" type="datetimeFigureOut">
               <a:rPr lang="fr-FR" smtClean="0"/>
-              <a:t>05/02/2023</a:t>
+              <a:t>11/02/2023</a:t>
             </a:fld>
             <a:endParaRPr lang="fr-FR"/>
           </a:p>
@@ -1105,7 +1105,7 @@
           <a:p>
             <a:fld id="{9F9D7BD0-09ED-4241-9B50-84DC221E5746}" type="datetimeFigureOut">
               <a:rPr lang="fr-FR" smtClean="0"/>
-              <a:t>05/02/2023</a:t>
+              <a:t>11/02/2023</a:t>
             </a:fld>
             <a:endParaRPr lang="fr-FR"/>
           </a:p>
@@ -1303,7 +1303,7 @@
           <a:p>
             <a:fld id="{9F9D7BD0-09ED-4241-9B50-84DC221E5746}" type="datetimeFigureOut">
               <a:rPr lang="fr-FR" smtClean="0"/>
-              <a:t>05/02/2023</a:t>
+              <a:t>11/02/2023</a:t>
             </a:fld>
             <a:endParaRPr lang="fr-FR"/>
           </a:p>
@@ -1578,7 +1578,7 @@
           <a:p>
             <a:fld id="{9F9D7BD0-09ED-4241-9B50-84DC221E5746}" type="datetimeFigureOut">
               <a:rPr lang="fr-FR" smtClean="0"/>
-              <a:t>05/02/2023</a:t>
+              <a:t>11/02/2023</a:t>
             </a:fld>
             <a:endParaRPr lang="fr-FR"/>
           </a:p>
@@ -1843,7 +1843,7 @@
           <a:p>
             <a:fld id="{9F9D7BD0-09ED-4241-9B50-84DC221E5746}" type="datetimeFigureOut">
               <a:rPr lang="fr-FR" smtClean="0"/>
-              <a:t>05/02/2023</a:t>
+              <a:t>11/02/2023</a:t>
             </a:fld>
             <a:endParaRPr lang="fr-FR"/>
           </a:p>
@@ -2255,7 +2255,7 @@
           <a:p>
             <a:fld id="{9F9D7BD0-09ED-4241-9B50-84DC221E5746}" type="datetimeFigureOut">
               <a:rPr lang="fr-FR" smtClean="0"/>
-              <a:t>05/02/2023</a:t>
+              <a:t>11/02/2023</a:t>
             </a:fld>
             <a:endParaRPr lang="fr-FR"/>
           </a:p>
@@ -2396,7 +2396,7 @@
           <a:p>
             <a:fld id="{9F9D7BD0-09ED-4241-9B50-84DC221E5746}" type="datetimeFigureOut">
               <a:rPr lang="fr-FR" smtClean="0"/>
-              <a:t>05/02/2023</a:t>
+              <a:t>11/02/2023</a:t>
             </a:fld>
             <a:endParaRPr lang="fr-FR"/>
           </a:p>
@@ -2509,7 +2509,7 @@
           <a:p>
             <a:fld id="{9F9D7BD0-09ED-4241-9B50-84DC221E5746}" type="datetimeFigureOut">
               <a:rPr lang="fr-FR" smtClean="0"/>
-              <a:t>05/02/2023</a:t>
+              <a:t>11/02/2023</a:t>
             </a:fld>
             <a:endParaRPr lang="fr-FR"/>
           </a:p>
@@ -2820,7 +2820,7 @@
           <a:p>
             <a:fld id="{9F9D7BD0-09ED-4241-9B50-84DC221E5746}" type="datetimeFigureOut">
               <a:rPr lang="fr-FR" smtClean="0"/>
-              <a:t>05/02/2023</a:t>
+              <a:t>11/02/2023</a:t>
             </a:fld>
             <a:endParaRPr lang="fr-FR"/>
           </a:p>
@@ -3108,7 +3108,7 @@
           <a:p>
             <a:fld id="{9F9D7BD0-09ED-4241-9B50-84DC221E5746}" type="datetimeFigureOut">
               <a:rPr lang="fr-FR" smtClean="0"/>
-              <a:t>05/02/2023</a:t>
+              <a:t>11/02/2023</a:t>
             </a:fld>
             <a:endParaRPr lang="fr-FR"/>
           </a:p>
@@ -3349,7 +3349,7 @@
           <a:p>
             <a:fld id="{9F9D7BD0-09ED-4241-9B50-84DC221E5746}" type="datetimeFigureOut">
               <a:rPr lang="fr-FR" smtClean="0"/>
-              <a:t>05/02/2023</a:t>
+              <a:t>11/02/2023</a:t>
             </a:fld>
             <a:endParaRPr lang="fr-FR"/>
           </a:p>
@@ -3811,7 +3811,7 @@
         <p:spPr>
           <a:xfrm>
             <a:off x="262934" y="173327"/>
-            <a:ext cx="4112793" cy="523220"/>
+            <a:ext cx="4298549" cy="523220"/>
           </a:xfrm>
           <a:prstGeom prst="rect">
             <a:avLst/>
@@ -3830,7 +3830,7 @@
             </a:r>
             <a:r>
               <a:rPr lang="fr-FR" b="1" dirty="0"/>
-              <a:t>carte F767</a:t>
+              <a:t>carte L476RG</a:t>
             </a:r>
             <a:endParaRPr lang="fr-FR" sz="2800" b="1" dirty="0"/>
           </a:p>
@@ -4234,6 +4234,104 @@
               </a:rPr>
               <a:t>APPROBATION EN COURS</a:t>
             </a:r>
+          </a:p>
+        </p:txBody>
+      </p:sp>
+      <p:sp>
+        <p:nvSpPr>
+          <p:cNvPr id="2" name="Rectangle : coins arrondis 1">
+            <a:extLst>
+              <a:ext uri="{FF2B5EF4-FFF2-40B4-BE49-F238E27FC236}">
+                <a16:creationId xmlns:a16="http://schemas.microsoft.com/office/drawing/2014/main" id="{1A03B397-F32C-4B09-F4BF-54AE00571954}"/>
+              </a:ext>
+            </a:extLst>
+          </p:cNvPr>
+          <p:cNvSpPr/>
+          <p:nvPr/>
+        </p:nvSpPr>
+        <p:spPr>
+          <a:xfrm>
+            <a:off x="293376" y="5900203"/>
+            <a:ext cx="1979043" cy="294693"/>
+          </a:xfrm>
+          <a:prstGeom prst="roundRect">
+            <a:avLst/>
+          </a:prstGeom>
+        </p:spPr>
+        <p:style>
+          <a:lnRef idx="2">
+            <a:schemeClr val="accent4">
+              <a:shade val="50000"/>
+            </a:schemeClr>
+          </a:lnRef>
+          <a:fillRef idx="1">
+            <a:schemeClr val="accent4"/>
+          </a:fillRef>
+          <a:effectRef idx="0">
+            <a:schemeClr val="accent4"/>
+          </a:effectRef>
+          <a:fontRef idx="minor">
+            <a:schemeClr val="lt1"/>
+          </a:fontRef>
+        </p:style>
+        <p:txBody>
+          <a:bodyPr rtlCol="0" anchor="ctr"/>
+          <a:lstStyle/>
+          <a:p>
+            <a:pPr algn="ctr"/>
+            <a:r>
+              <a:rPr lang="fr-FR" b="1" dirty="0"/>
+              <a:t>ATTENTION</a:t>
+            </a:r>
+          </a:p>
+        </p:txBody>
+      </p:sp>
+      <p:sp>
+        <p:nvSpPr>
+          <p:cNvPr id="7" name="ZoneTexte 6">
+            <a:extLst>
+              <a:ext uri="{FF2B5EF4-FFF2-40B4-BE49-F238E27FC236}">
+                <a16:creationId xmlns:a16="http://schemas.microsoft.com/office/drawing/2014/main" id="{F9758AF5-6DF3-16AA-9749-473C7E56A8A1}"/>
+              </a:ext>
+            </a:extLst>
+          </p:cNvPr>
+          <p:cNvSpPr txBox="1"/>
+          <p:nvPr/>
+        </p:nvSpPr>
+        <p:spPr>
+          <a:xfrm>
+            <a:off x="293376" y="6202860"/>
+            <a:ext cx="1979043" cy="461665"/>
+          </a:xfrm>
+          <a:prstGeom prst="rect">
+            <a:avLst/>
+          </a:prstGeom>
+          <a:noFill/>
+        </p:spPr>
+        <p:txBody>
+          <a:bodyPr wrap="square" rtlCol="0">
+            <a:spAutoFit/>
+          </a:bodyPr>
+          <a:lstStyle/>
+          <a:p>
+            <a:pPr algn="just"/>
+            <a:r>
+              <a:rPr lang="fr-FR" sz="1200" b="1" dirty="0"/>
+              <a:t>Ne pas utiliser</a:t>
+            </a:r>
+            <a:r>
+              <a:rPr lang="fr-FR" sz="1200" dirty="0"/>
+              <a:t> le connecteur </a:t>
+            </a:r>
+            <a:r>
+              <a:rPr lang="fr-FR" sz="1200" b="1" dirty="0"/>
+              <a:t>J23</a:t>
+            </a:r>
+            <a:r>
+              <a:rPr lang="fr-FR" sz="1200" dirty="0"/>
+              <a:t> ! (erreur de conception)</a:t>
+            </a:r>
+            <a:endParaRPr lang="fr-FR" sz="1200" i="1" dirty="0"/>
           </a:p>
         </p:txBody>
       </p:sp>

</xml_diff>

<commit_message>
Mise à jour Brochage Robot Holonome
</commit_message>
<xml_diff>
--- a/Maquettes/Elec_Num_Emb/Robot_Holonome/brochages.pptx
+++ b/Maquettes/Elec_Num_Emb/Robot_Holonome/brochages.pptx
@@ -200,7 +200,7 @@
           <a:p>
             <a:fld id="{DAC67291-13FB-4A85-9B62-8BED92F848C0}" type="datetimeFigureOut">
               <a:rPr lang="fr-FR" smtClean="0"/>
-              <a:t>01/03/2023</a:t>
+              <a:t>07/03/2023</a:t>
             </a:fld>
             <a:endParaRPr lang="fr-FR"/>
           </a:p>
@@ -698,7 +698,7 @@
           <a:p>
             <a:fld id="{9F9D7BD0-09ED-4241-9B50-84DC221E5746}" type="datetimeFigureOut">
               <a:rPr lang="fr-FR" smtClean="0"/>
-              <a:t>01/03/2023</a:t>
+              <a:t>07/03/2023</a:t>
             </a:fld>
             <a:endParaRPr lang="fr-FR"/>
           </a:p>
@@ -896,7 +896,7 @@
           <a:p>
             <a:fld id="{9F9D7BD0-09ED-4241-9B50-84DC221E5746}" type="datetimeFigureOut">
               <a:rPr lang="fr-FR" smtClean="0"/>
-              <a:t>01/03/2023</a:t>
+              <a:t>07/03/2023</a:t>
             </a:fld>
             <a:endParaRPr lang="fr-FR"/>
           </a:p>
@@ -1104,7 +1104,7 @@
           <a:p>
             <a:fld id="{9F9D7BD0-09ED-4241-9B50-84DC221E5746}" type="datetimeFigureOut">
               <a:rPr lang="fr-FR" smtClean="0"/>
-              <a:t>01/03/2023</a:t>
+              <a:t>07/03/2023</a:t>
             </a:fld>
             <a:endParaRPr lang="fr-FR"/>
           </a:p>
@@ -1302,7 +1302,7 @@
           <a:p>
             <a:fld id="{9F9D7BD0-09ED-4241-9B50-84DC221E5746}" type="datetimeFigureOut">
               <a:rPr lang="fr-FR" smtClean="0"/>
-              <a:t>01/03/2023</a:t>
+              <a:t>07/03/2023</a:t>
             </a:fld>
             <a:endParaRPr lang="fr-FR"/>
           </a:p>
@@ -1577,7 +1577,7 @@
           <a:p>
             <a:fld id="{9F9D7BD0-09ED-4241-9B50-84DC221E5746}" type="datetimeFigureOut">
               <a:rPr lang="fr-FR" smtClean="0"/>
-              <a:t>01/03/2023</a:t>
+              <a:t>07/03/2023</a:t>
             </a:fld>
             <a:endParaRPr lang="fr-FR"/>
           </a:p>
@@ -1842,7 +1842,7 @@
           <a:p>
             <a:fld id="{9F9D7BD0-09ED-4241-9B50-84DC221E5746}" type="datetimeFigureOut">
               <a:rPr lang="fr-FR" smtClean="0"/>
-              <a:t>01/03/2023</a:t>
+              <a:t>07/03/2023</a:t>
             </a:fld>
             <a:endParaRPr lang="fr-FR"/>
           </a:p>
@@ -2254,7 +2254,7 @@
           <a:p>
             <a:fld id="{9F9D7BD0-09ED-4241-9B50-84DC221E5746}" type="datetimeFigureOut">
               <a:rPr lang="fr-FR" smtClean="0"/>
-              <a:t>01/03/2023</a:t>
+              <a:t>07/03/2023</a:t>
             </a:fld>
             <a:endParaRPr lang="fr-FR"/>
           </a:p>
@@ -2395,7 +2395,7 @@
           <a:p>
             <a:fld id="{9F9D7BD0-09ED-4241-9B50-84DC221E5746}" type="datetimeFigureOut">
               <a:rPr lang="fr-FR" smtClean="0"/>
-              <a:t>01/03/2023</a:t>
+              <a:t>07/03/2023</a:t>
             </a:fld>
             <a:endParaRPr lang="fr-FR"/>
           </a:p>
@@ -2508,7 +2508,7 @@
           <a:p>
             <a:fld id="{9F9D7BD0-09ED-4241-9B50-84DC221E5746}" type="datetimeFigureOut">
               <a:rPr lang="fr-FR" smtClean="0"/>
-              <a:t>01/03/2023</a:t>
+              <a:t>07/03/2023</a:t>
             </a:fld>
             <a:endParaRPr lang="fr-FR"/>
           </a:p>
@@ -2819,7 +2819,7 @@
           <a:p>
             <a:fld id="{9F9D7BD0-09ED-4241-9B50-84DC221E5746}" type="datetimeFigureOut">
               <a:rPr lang="fr-FR" smtClean="0"/>
-              <a:t>01/03/2023</a:t>
+              <a:t>07/03/2023</a:t>
             </a:fld>
             <a:endParaRPr lang="fr-FR"/>
           </a:p>
@@ -3107,7 +3107,7 @@
           <a:p>
             <a:fld id="{9F9D7BD0-09ED-4241-9B50-84DC221E5746}" type="datetimeFigureOut">
               <a:rPr lang="fr-FR" smtClean="0"/>
-              <a:t>01/03/2023</a:t>
+              <a:t>07/03/2023</a:t>
             </a:fld>
             <a:endParaRPr lang="fr-FR"/>
           </a:p>
@@ -3348,7 +3348,7 @@
           <a:p>
             <a:fld id="{9F9D7BD0-09ED-4241-9B50-84DC221E5746}" type="datetimeFigureOut">
               <a:rPr lang="fr-FR" smtClean="0"/>
-              <a:t>01/03/2023</a:t>
+              <a:t>07/03/2023</a:t>
             </a:fld>
             <a:endParaRPr lang="fr-FR"/>
           </a:p>
@@ -14352,7 +14352,7 @@
             <a:pPr algn="ctr"/>
             <a:r>
               <a:rPr lang="fr-FR" sz="900" dirty="0"/>
-              <a:t>PH_1</a:t>
+              <a:t>PA_12</a:t>
             </a:r>
           </a:p>
         </p:txBody>
@@ -14505,7 +14505,7 @@
             <a:pPr algn="ctr"/>
             <a:r>
               <a:rPr lang="fr-FR" sz="900" dirty="0"/>
-              <a:t>PH_0</a:t>
+              <a:t>PA_11</a:t>
             </a:r>
           </a:p>
         </p:txBody>
@@ -14557,7 +14557,7 @@
             <a:pPr algn="ctr"/>
             <a:r>
               <a:rPr lang="fr-FR" sz="900" dirty="0"/>
-              <a:t>PD_2</a:t>
+              <a:t>PB_12</a:t>
             </a:r>
           </a:p>
         </p:txBody>

</xml_diff>

<commit_message>
Mise à jour Maquette Robot Holonome - brochage
</commit_message>
<xml_diff>
--- a/Maquettes/Elec_Num_Emb/Robot_Holonome/brochages.pptx
+++ b/Maquettes/Elec_Num_Emb/Robot_Holonome/brochages.pptx
@@ -5,13 +5,15 @@
     <p:sldMasterId id="2147483648" r:id="rId1"/>
   </p:sldMasterIdLst>
   <p:notesMasterIdLst>
-    <p:notesMasterId r:id="rId6"/>
+    <p:notesMasterId r:id="rId8"/>
   </p:notesMasterIdLst>
   <p:sldIdLst>
     <p:sldId id="260" r:id="rId2"/>
     <p:sldId id="266" r:id="rId3"/>
-    <p:sldId id="261" r:id="rId4"/>
-    <p:sldId id="259" r:id="rId5"/>
+    <p:sldId id="267" r:id="rId4"/>
+    <p:sldId id="268" r:id="rId5"/>
+    <p:sldId id="261" r:id="rId6"/>
+    <p:sldId id="259" r:id="rId7"/>
   </p:sldIdLst>
   <p:sldSz cx="12192000" cy="6858000"/>
   <p:notesSz cx="6858000" cy="9144000"/>
@@ -200,7 +202,7 @@
           <a:p>
             <a:fld id="{DAC67291-13FB-4A85-9B62-8BED92F848C0}" type="datetimeFigureOut">
               <a:rPr lang="fr-FR" smtClean="0"/>
-              <a:t>07/03/2023</a:t>
+              <a:t>12/03/2023</a:t>
             </a:fld>
             <a:endParaRPr lang="fr-FR"/>
           </a:p>
@@ -698,7 +700,7 @@
           <a:p>
             <a:fld id="{9F9D7BD0-09ED-4241-9B50-84DC221E5746}" type="datetimeFigureOut">
               <a:rPr lang="fr-FR" smtClean="0"/>
-              <a:t>07/03/2023</a:t>
+              <a:t>12/03/2023</a:t>
             </a:fld>
             <a:endParaRPr lang="fr-FR"/>
           </a:p>
@@ -896,7 +898,7 @@
           <a:p>
             <a:fld id="{9F9D7BD0-09ED-4241-9B50-84DC221E5746}" type="datetimeFigureOut">
               <a:rPr lang="fr-FR" smtClean="0"/>
-              <a:t>07/03/2023</a:t>
+              <a:t>12/03/2023</a:t>
             </a:fld>
             <a:endParaRPr lang="fr-FR"/>
           </a:p>
@@ -1104,7 +1106,7 @@
           <a:p>
             <a:fld id="{9F9D7BD0-09ED-4241-9B50-84DC221E5746}" type="datetimeFigureOut">
               <a:rPr lang="fr-FR" smtClean="0"/>
-              <a:t>07/03/2023</a:t>
+              <a:t>12/03/2023</a:t>
             </a:fld>
             <a:endParaRPr lang="fr-FR"/>
           </a:p>
@@ -1302,7 +1304,7 @@
           <a:p>
             <a:fld id="{9F9D7BD0-09ED-4241-9B50-84DC221E5746}" type="datetimeFigureOut">
               <a:rPr lang="fr-FR" smtClean="0"/>
-              <a:t>07/03/2023</a:t>
+              <a:t>12/03/2023</a:t>
             </a:fld>
             <a:endParaRPr lang="fr-FR"/>
           </a:p>
@@ -1577,7 +1579,7 @@
           <a:p>
             <a:fld id="{9F9D7BD0-09ED-4241-9B50-84DC221E5746}" type="datetimeFigureOut">
               <a:rPr lang="fr-FR" smtClean="0"/>
-              <a:t>07/03/2023</a:t>
+              <a:t>12/03/2023</a:t>
             </a:fld>
             <a:endParaRPr lang="fr-FR"/>
           </a:p>
@@ -1842,7 +1844,7 @@
           <a:p>
             <a:fld id="{9F9D7BD0-09ED-4241-9B50-84DC221E5746}" type="datetimeFigureOut">
               <a:rPr lang="fr-FR" smtClean="0"/>
-              <a:t>07/03/2023</a:t>
+              <a:t>12/03/2023</a:t>
             </a:fld>
             <a:endParaRPr lang="fr-FR"/>
           </a:p>
@@ -2254,7 +2256,7 @@
           <a:p>
             <a:fld id="{9F9D7BD0-09ED-4241-9B50-84DC221E5746}" type="datetimeFigureOut">
               <a:rPr lang="fr-FR" smtClean="0"/>
-              <a:t>07/03/2023</a:t>
+              <a:t>12/03/2023</a:t>
             </a:fld>
             <a:endParaRPr lang="fr-FR"/>
           </a:p>
@@ -2395,7 +2397,7 @@
           <a:p>
             <a:fld id="{9F9D7BD0-09ED-4241-9B50-84DC221E5746}" type="datetimeFigureOut">
               <a:rPr lang="fr-FR" smtClean="0"/>
-              <a:t>07/03/2023</a:t>
+              <a:t>12/03/2023</a:t>
             </a:fld>
             <a:endParaRPr lang="fr-FR"/>
           </a:p>
@@ -2508,7 +2510,7 @@
           <a:p>
             <a:fld id="{9F9D7BD0-09ED-4241-9B50-84DC221E5746}" type="datetimeFigureOut">
               <a:rPr lang="fr-FR" smtClean="0"/>
-              <a:t>07/03/2023</a:t>
+              <a:t>12/03/2023</a:t>
             </a:fld>
             <a:endParaRPr lang="fr-FR"/>
           </a:p>
@@ -2819,7 +2821,7 @@
           <a:p>
             <a:fld id="{9F9D7BD0-09ED-4241-9B50-84DC221E5746}" type="datetimeFigureOut">
               <a:rPr lang="fr-FR" smtClean="0"/>
-              <a:t>07/03/2023</a:t>
+              <a:t>12/03/2023</a:t>
             </a:fld>
             <a:endParaRPr lang="fr-FR"/>
           </a:p>
@@ -3107,7 +3109,7 @@
           <a:p>
             <a:fld id="{9F9D7BD0-09ED-4241-9B50-84DC221E5746}" type="datetimeFigureOut">
               <a:rPr lang="fr-FR" smtClean="0"/>
-              <a:t>07/03/2023</a:t>
+              <a:t>12/03/2023</a:t>
             </a:fld>
             <a:endParaRPr lang="fr-FR"/>
           </a:p>
@@ -3348,7 +3350,7 @@
           <a:p>
             <a:fld id="{9F9D7BD0-09ED-4241-9B50-84DC221E5746}" type="datetimeFigureOut">
               <a:rPr lang="fr-FR" smtClean="0"/>
-              <a:t>07/03/2023</a:t>
+              <a:t>12/03/2023</a:t>
             </a:fld>
             <a:endParaRPr lang="fr-FR"/>
           </a:p>
@@ -4836,45 +4838,6 @@
           </a:p>
         </p:txBody>
       </p:sp>
-      <p:sp>
-        <p:nvSpPr>
-          <p:cNvPr id="148" name="ZoneTexte 147">
-            <a:extLst>
-              <a:ext uri="{FF2B5EF4-FFF2-40B4-BE49-F238E27FC236}">
-                <a16:creationId xmlns:a16="http://schemas.microsoft.com/office/drawing/2014/main" id="{2167393C-FFC6-45CF-BF10-CCAFC3C5C845}"/>
-              </a:ext>
-            </a:extLst>
-          </p:cNvPr>
-          <p:cNvSpPr txBox="1"/>
-          <p:nvPr/>
-        </p:nvSpPr>
-        <p:spPr>
-          <a:xfrm>
-            <a:off x="779319" y="1059242"/>
-            <a:ext cx="3164264" cy="369332"/>
-          </a:xfrm>
-          <a:prstGeom prst="rect">
-            <a:avLst/>
-          </a:prstGeom>
-          <a:noFill/>
-        </p:spPr>
-        <p:txBody>
-          <a:bodyPr wrap="none" rtlCol="0">
-            <a:spAutoFit/>
-          </a:bodyPr>
-          <a:lstStyle/>
-          <a:p>
-            <a:r>
-              <a:rPr lang="fr-FR" dirty="0">
-                <a:solidFill>
-                  <a:srgbClr val="002060"/>
-                </a:solidFill>
-              </a:rPr>
-              <a:t>Programme Nucléo RobotHolo :</a:t>
-            </a:r>
-          </a:p>
-        </p:txBody>
-      </p:sp>
       <p:pic>
         <p:nvPicPr>
           <p:cNvPr id="3" name="Image 2">
@@ -4919,7 +4882,7 @@
         </p:nvSpPr>
         <p:spPr>
           <a:xfrm>
-            <a:off x="8922740" y="4366365"/>
+            <a:off x="8791821" y="4349079"/>
             <a:ext cx="742396" cy="159159"/>
           </a:xfrm>
           <a:prstGeom prst="roundRect">
@@ -4971,7 +4934,7 @@
         </p:nvSpPr>
         <p:spPr>
           <a:xfrm>
-            <a:off x="8922740" y="4596240"/>
+            <a:off x="8791821" y="4575936"/>
             <a:ext cx="742396" cy="159159"/>
           </a:xfrm>
           <a:prstGeom prst="roundRect">
@@ -7369,6 +7332,3277 @@
       </p:grpSpPr>
       <p:sp>
         <p:nvSpPr>
+          <p:cNvPr id="4" name="ZoneTexte 3">
+            <a:extLst>
+              <a:ext uri="{FF2B5EF4-FFF2-40B4-BE49-F238E27FC236}">
+                <a16:creationId xmlns:a16="http://schemas.microsoft.com/office/drawing/2014/main" id="{B99AC363-602C-462B-AB02-D3CE737EEB06}"/>
+              </a:ext>
+            </a:extLst>
+          </p:cNvPr>
+          <p:cNvSpPr txBox="1"/>
+          <p:nvPr/>
+        </p:nvSpPr>
+        <p:spPr>
+          <a:xfrm>
+            <a:off x="262934" y="173327"/>
+            <a:ext cx="3748142" cy="523220"/>
+          </a:xfrm>
+          <a:prstGeom prst="rect">
+            <a:avLst/>
+          </a:prstGeom>
+          <a:noFill/>
+        </p:spPr>
+        <p:txBody>
+          <a:bodyPr wrap="none" rtlCol="0">
+            <a:spAutoFit/>
+          </a:bodyPr>
+          <a:lstStyle/>
+          <a:p>
+            <a:r>
+              <a:rPr lang="fr-FR" sz="2800" b="1" dirty="0"/>
+              <a:t>Robot Holonome _ New</a:t>
+            </a:r>
+          </a:p>
+        </p:txBody>
+      </p:sp>
+      <p:sp>
+        <p:nvSpPr>
+          <p:cNvPr id="75" name="ZoneTexte 74">
+            <a:extLst>
+              <a:ext uri="{FF2B5EF4-FFF2-40B4-BE49-F238E27FC236}">
+                <a16:creationId xmlns:a16="http://schemas.microsoft.com/office/drawing/2014/main" id="{9900FBC1-3C7F-495D-98E2-7B766A171227}"/>
+              </a:ext>
+            </a:extLst>
+          </p:cNvPr>
+          <p:cNvSpPr txBox="1"/>
+          <p:nvPr/>
+        </p:nvSpPr>
+        <p:spPr>
+          <a:xfrm>
+            <a:off x="9219040" y="173327"/>
+            <a:ext cx="2626731" cy="584775"/>
+          </a:xfrm>
+          <a:prstGeom prst="rect">
+            <a:avLst/>
+          </a:prstGeom>
+          <a:noFill/>
+        </p:spPr>
+        <p:txBody>
+          <a:bodyPr wrap="square" rtlCol="0">
+            <a:spAutoFit/>
+          </a:bodyPr>
+          <a:lstStyle/>
+          <a:p>
+            <a:pPr marL="285750" indent="-285750">
+              <a:buFontTx/>
+              <a:buChar char="-"/>
+            </a:pPr>
+            <a:r>
+              <a:rPr lang="fr-FR" sz="1600" b="1" dirty="0">
+                <a:solidFill>
+                  <a:schemeClr val="accent2"/>
+                </a:solidFill>
+              </a:rPr>
+              <a:t>Contrôleur de lumière</a:t>
+            </a:r>
+          </a:p>
+          <a:p>
+            <a:pPr marL="285750" indent="-285750">
+              <a:buFontTx/>
+              <a:buChar char="-"/>
+            </a:pPr>
+            <a:r>
+              <a:rPr lang="fr-FR" sz="1600" b="1" dirty="0">
+                <a:solidFill>
+                  <a:schemeClr val="accent2"/>
+                </a:solidFill>
+              </a:rPr>
+              <a:t>Communication RF</a:t>
+            </a:r>
+          </a:p>
+        </p:txBody>
+      </p:sp>
+      <p:cxnSp>
+        <p:nvCxnSpPr>
+          <p:cNvPr id="21" name="Connecteur droit 20">
+            <a:extLst>
+              <a:ext uri="{FF2B5EF4-FFF2-40B4-BE49-F238E27FC236}">
+                <a16:creationId xmlns:a16="http://schemas.microsoft.com/office/drawing/2014/main" id="{819D541D-B546-4141-B179-5C156243B3BC}"/>
+              </a:ext>
+            </a:extLst>
+          </p:cNvPr>
+          <p:cNvCxnSpPr/>
+          <p:nvPr/>
+        </p:nvCxnSpPr>
+        <p:spPr>
+          <a:xfrm>
+            <a:off x="355107" y="1363758"/>
+            <a:ext cx="11558726" cy="0"/>
+          </a:xfrm>
+          <a:prstGeom prst="line">
+            <a:avLst/>
+          </a:prstGeom>
+          <a:ln w="19050">
+            <a:solidFill>
+              <a:srgbClr val="002060"/>
+            </a:solidFill>
+          </a:ln>
+        </p:spPr>
+        <p:style>
+          <a:lnRef idx="1">
+            <a:schemeClr val="accent2"/>
+          </a:lnRef>
+          <a:fillRef idx="0">
+            <a:schemeClr val="accent2"/>
+          </a:fillRef>
+          <a:effectRef idx="0">
+            <a:schemeClr val="accent2"/>
+          </a:effectRef>
+          <a:fontRef idx="minor">
+            <a:schemeClr val="tx1"/>
+          </a:fontRef>
+        </p:style>
+      </p:cxnSp>
+      <p:sp>
+        <p:nvSpPr>
+          <p:cNvPr id="23" name="ZoneTexte 22">
+            <a:extLst>
+              <a:ext uri="{FF2B5EF4-FFF2-40B4-BE49-F238E27FC236}">
+                <a16:creationId xmlns:a16="http://schemas.microsoft.com/office/drawing/2014/main" id="{B1275299-DF0B-45A5-9802-401FA64072C2}"/>
+              </a:ext>
+            </a:extLst>
+          </p:cNvPr>
+          <p:cNvSpPr txBox="1"/>
+          <p:nvPr/>
+        </p:nvSpPr>
+        <p:spPr>
+          <a:xfrm>
+            <a:off x="262934" y="754727"/>
+            <a:ext cx="4053610" cy="369332"/>
+          </a:xfrm>
+          <a:prstGeom prst="rect">
+            <a:avLst/>
+          </a:prstGeom>
+          <a:noFill/>
+        </p:spPr>
+        <p:txBody>
+          <a:bodyPr wrap="none" rtlCol="0">
+            <a:spAutoFit/>
+          </a:bodyPr>
+          <a:lstStyle/>
+          <a:p>
+            <a:r>
+              <a:rPr lang="fr-FR" dirty="0">
+                <a:solidFill>
+                  <a:srgbClr val="002060"/>
+                </a:solidFill>
+              </a:rPr>
+              <a:t>Robot Holonome / Moteurs et encodeurs</a:t>
+            </a:r>
+          </a:p>
+        </p:txBody>
+      </p:sp>
+      <p:cxnSp>
+        <p:nvCxnSpPr>
+          <p:cNvPr id="31" name="Connecteur droit 30">
+            <a:extLst>
+              <a:ext uri="{FF2B5EF4-FFF2-40B4-BE49-F238E27FC236}">
+                <a16:creationId xmlns:a16="http://schemas.microsoft.com/office/drawing/2014/main" id="{403E5D90-3502-4F6C-AD7A-7A4E01D26DE6}"/>
+              </a:ext>
+            </a:extLst>
+          </p:cNvPr>
+          <p:cNvCxnSpPr>
+            <a:cxnSpLocks/>
+          </p:cNvCxnSpPr>
+          <p:nvPr/>
+        </p:nvCxnSpPr>
+        <p:spPr>
+          <a:xfrm>
+            <a:off x="355107" y="754727"/>
+            <a:ext cx="7421732" cy="0"/>
+          </a:xfrm>
+          <a:prstGeom prst="line">
+            <a:avLst/>
+          </a:prstGeom>
+          <a:ln w="19050">
+            <a:solidFill>
+              <a:srgbClr val="002060"/>
+            </a:solidFill>
+          </a:ln>
+        </p:spPr>
+        <p:style>
+          <a:lnRef idx="1">
+            <a:schemeClr val="accent2"/>
+          </a:lnRef>
+          <a:fillRef idx="0">
+            <a:schemeClr val="accent2"/>
+          </a:fillRef>
+          <a:effectRef idx="0">
+            <a:schemeClr val="accent2"/>
+          </a:effectRef>
+          <a:fontRef idx="minor">
+            <a:schemeClr val="tx1"/>
+          </a:fontRef>
+        </p:style>
+      </p:cxnSp>
+      <p:pic>
+        <p:nvPicPr>
+          <p:cNvPr id="149" name="Image 148">
+            <a:extLst>
+              <a:ext uri="{FF2B5EF4-FFF2-40B4-BE49-F238E27FC236}">
+                <a16:creationId xmlns:a16="http://schemas.microsoft.com/office/drawing/2014/main" id="{EBA18948-9D74-19A1-051E-E530BE2544A6}"/>
+              </a:ext>
+            </a:extLst>
+          </p:cNvPr>
+          <p:cNvPicPr>
+            <a:picLocks noChangeAspect="1"/>
+          </p:cNvPicPr>
+          <p:nvPr/>
+        </p:nvPicPr>
+        <p:blipFill>
+          <a:blip r:embed="rId2"/>
+          <a:stretch>
+            <a:fillRect/>
+          </a:stretch>
+        </p:blipFill>
+        <p:spPr>
+          <a:xfrm>
+            <a:off x="334897" y="1464163"/>
+            <a:ext cx="5972675" cy="5220505"/>
+          </a:xfrm>
+          <a:prstGeom prst="rect">
+            <a:avLst/>
+          </a:prstGeom>
+        </p:spPr>
+      </p:pic>
+      <p:sp>
+        <p:nvSpPr>
+          <p:cNvPr id="150" name="Rectangle : coins arrondis 149">
+            <a:extLst>
+              <a:ext uri="{FF2B5EF4-FFF2-40B4-BE49-F238E27FC236}">
+                <a16:creationId xmlns:a16="http://schemas.microsoft.com/office/drawing/2014/main" id="{C504910B-5EDD-6B4F-2E59-9607C5ECBE22}"/>
+              </a:ext>
+            </a:extLst>
+          </p:cNvPr>
+          <p:cNvSpPr/>
+          <p:nvPr/>
+        </p:nvSpPr>
+        <p:spPr>
+          <a:xfrm rot="5400000">
+            <a:off x="8160860" y="268053"/>
+            <a:ext cx="386677" cy="3789401"/>
+          </a:xfrm>
+          <a:prstGeom prst="roundRect">
+            <a:avLst/>
+          </a:prstGeom>
+          <a:solidFill>
+            <a:schemeClr val="bg1"/>
+          </a:solidFill>
+          <a:ln>
+            <a:solidFill>
+              <a:schemeClr val="tx1"/>
+            </a:solidFill>
+          </a:ln>
+        </p:spPr>
+        <p:style>
+          <a:lnRef idx="2">
+            <a:schemeClr val="accent1">
+              <a:shade val="50000"/>
+            </a:schemeClr>
+          </a:lnRef>
+          <a:fillRef idx="1">
+            <a:schemeClr val="accent1"/>
+          </a:fillRef>
+          <a:effectRef idx="0">
+            <a:schemeClr val="accent1"/>
+          </a:effectRef>
+          <a:fontRef idx="minor">
+            <a:schemeClr val="lt1"/>
+          </a:fontRef>
+        </p:style>
+        <p:txBody>
+          <a:bodyPr vert="vert270" rtlCol="0" anchor="ctr"/>
+          <a:lstStyle/>
+          <a:p>
+            <a:pPr algn="ctr"/>
+            <a:r>
+              <a:rPr lang="fr-FR" sz="1400" dirty="0">
+                <a:solidFill>
+                  <a:schemeClr val="tx1"/>
+                </a:solidFill>
+              </a:rPr>
+              <a:t>Réduction : 1 / 74,9</a:t>
+            </a:r>
+          </a:p>
+        </p:txBody>
+      </p:sp>
+      <p:sp>
+        <p:nvSpPr>
+          <p:cNvPr id="151" name="Rectangle : coins arrondis 150">
+            <a:extLst>
+              <a:ext uri="{FF2B5EF4-FFF2-40B4-BE49-F238E27FC236}">
+                <a16:creationId xmlns:a16="http://schemas.microsoft.com/office/drawing/2014/main" id="{E2B20DEA-1D63-0803-F76C-13D8069AFB8B}"/>
+              </a:ext>
+            </a:extLst>
+          </p:cNvPr>
+          <p:cNvSpPr/>
+          <p:nvPr/>
+        </p:nvSpPr>
+        <p:spPr>
+          <a:xfrm rot="5400000">
+            <a:off x="8160860" y="873709"/>
+            <a:ext cx="386677" cy="3789401"/>
+          </a:xfrm>
+          <a:prstGeom prst="roundRect">
+            <a:avLst/>
+          </a:prstGeom>
+          <a:solidFill>
+            <a:schemeClr val="bg1"/>
+          </a:solidFill>
+          <a:ln>
+            <a:solidFill>
+              <a:schemeClr val="tx1"/>
+            </a:solidFill>
+          </a:ln>
+        </p:spPr>
+        <p:style>
+          <a:lnRef idx="2">
+            <a:schemeClr val="accent1">
+              <a:shade val="50000"/>
+            </a:schemeClr>
+          </a:lnRef>
+          <a:fillRef idx="1">
+            <a:schemeClr val="accent1"/>
+          </a:fillRef>
+          <a:effectRef idx="0">
+            <a:schemeClr val="accent1"/>
+          </a:effectRef>
+          <a:fontRef idx="minor">
+            <a:schemeClr val="lt1"/>
+          </a:fontRef>
+        </p:style>
+        <p:txBody>
+          <a:bodyPr vert="vert270" rtlCol="0" anchor="ctr"/>
+          <a:lstStyle/>
+          <a:p>
+            <a:pPr algn="ctr"/>
+            <a:r>
+              <a:rPr lang="fr-FR" sz="1400" dirty="0">
+                <a:solidFill>
+                  <a:schemeClr val="tx1"/>
+                </a:solidFill>
+              </a:rPr>
+              <a:t>Codeur : 360 CPR</a:t>
+            </a:r>
+          </a:p>
+        </p:txBody>
+      </p:sp>
+    </p:spTree>
+    <p:extLst>
+      <p:ext uri="{BB962C8B-B14F-4D97-AF65-F5344CB8AC3E}">
+        <p14:creationId xmlns:p14="http://schemas.microsoft.com/office/powerpoint/2010/main" val="644834141"/>
+      </p:ext>
+    </p:extLst>
+  </p:cSld>
+  <p:clrMapOvr>
+    <a:masterClrMapping/>
+  </p:clrMapOvr>
+</p:sld>
+</file>
+
+<file path=ppt/slides/slide4.xml><?xml version="1.0" encoding="utf-8"?>
+<p:sld xmlns:a="http://schemas.openxmlformats.org/drawingml/2006/main" xmlns:r="http://schemas.openxmlformats.org/officeDocument/2006/relationships" xmlns:p="http://schemas.openxmlformats.org/presentationml/2006/main">
+  <p:cSld>
+    <p:spTree>
+      <p:nvGrpSpPr>
+        <p:cNvPr id="1" name=""/>
+        <p:cNvGrpSpPr/>
+        <p:nvPr/>
+      </p:nvGrpSpPr>
+      <p:grpSpPr>
+        <a:xfrm>
+          <a:off x="0" y="0"/>
+          <a:ext cx="0" cy="0"/>
+          <a:chOff x="0" y="0"/>
+          <a:chExt cx="0" cy="0"/>
+        </a:xfrm>
+      </p:grpSpPr>
+      <p:sp>
+        <p:nvSpPr>
+          <p:cNvPr id="26" name="Rectangle : coins arrondis 25">
+            <a:extLst>
+              <a:ext uri="{FF2B5EF4-FFF2-40B4-BE49-F238E27FC236}">
+                <a16:creationId xmlns:a16="http://schemas.microsoft.com/office/drawing/2014/main" id="{E05F433C-88A9-4BC2-A37E-A423DEAF4E69}"/>
+              </a:ext>
+            </a:extLst>
+          </p:cNvPr>
+          <p:cNvSpPr/>
+          <p:nvPr/>
+        </p:nvSpPr>
+        <p:spPr>
+          <a:xfrm>
+            <a:off x="428625" y="1603459"/>
+            <a:ext cx="922585" cy="3825966"/>
+          </a:xfrm>
+          <a:prstGeom prst="roundRect">
+            <a:avLst/>
+          </a:prstGeom>
+          <a:solidFill>
+            <a:schemeClr val="bg2"/>
+          </a:solidFill>
+        </p:spPr>
+        <p:style>
+          <a:lnRef idx="2">
+            <a:schemeClr val="accent1">
+              <a:shade val="50000"/>
+            </a:schemeClr>
+          </a:lnRef>
+          <a:fillRef idx="1">
+            <a:schemeClr val="accent1"/>
+          </a:fillRef>
+          <a:effectRef idx="0">
+            <a:schemeClr val="accent1"/>
+          </a:effectRef>
+          <a:fontRef idx="minor">
+            <a:schemeClr val="lt1"/>
+          </a:fontRef>
+        </p:style>
+        <p:txBody>
+          <a:bodyPr vert="vert270" rtlCol="0" anchor="ctr"/>
+          <a:lstStyle/>
+          <a:p>
+            <a:pPr algn="ctr"/>
+            <a:r>
+              <a:rPr lang="fr-FR" sz="2400" dirty="0" err="1">
+                <a:solidFill>
+                  <a:schemeClr val="bg1">
+                    <a:lumMod val="50000"/>
+                  </a:schemeClr>
+                </a:solidFill>
+              </a:rPr>
+              <a:t>Nucleo</a:t>
+            </a:r>
+            <a:r>
+              <a:rPr lang="fr-FR" sz="2400" dirty="0">
+                <a:solidFill>
+                  <a:schemeClr val="bg1">
+                    <a:lumMod val="50000"/>
+                  </a:schemeClr>
+                </a:solidFill>
+              </a:rPr>
+              <a:t> </a:t>
+            </a:r>
+            <a:r>
+              <a:rPr lang="fr-FR" sz="2400" dirty="0" err="1">
+                <a:solidFill>
+                  <a:schemeClr val="bg1">
+                    <a:lumMod val="50000"/>
+                  </a:schemeClr>
+                </a:solidFill>
+              </a:rPr>
+              <a:t>Board</a:t>
+            </a:r>
+            <a:endParaRPr lang="fr-FR" sz="2400" dirty="0">
+              <a:solidFill>
+                <a:schemeClr val="bg1">
+                  <a:lumMod val="50000"/>
+                </a:schemeClr>
+              </a:solidFill>
+            </a:endParaRPr>
+          </a:p>
+        </p:txBody>
+      </p:sp>
+      <p:sp>
+        <p:nvSpPr>
+          <p:cNvPr id="4" name="ZoneTexte 3">
+            <a:extLst>
+              <a:ext uri="{FF2B5EF4-FFF2-40B4-BE49-F238E27FC236}">
+                <a16:creationId xmlns:a16="http://schemas.microsoft.com/office/drawing/2014/main" id="{B99AC363-602C-462B-AB02-D3CE737EEB06}"/>
+              </a:ext>
+            </a:extLst>
+          </p:cNvPr>
+          <p:cNvSpPr txBox="1"/>
+          <p:nvPr/>
+        </p:nvSpPr>
+        <p:spPr>
+          <a:xfrm>
+            <a:off x="262934" y="173327"/>
+            <a:ext cx="3748142" cy="523220"/>
+          </a:xfrm>
+          <a:prstGeom prst="rect">
+            <a:avLst/>
+          </a:prstGeom>
+          <a:noFill/>
+        </p:spPr>
+        <p:txBody>
+          <a:bodyPr wrap="none" rtlCol="0">
+            <a:spAutoFit/>
+          </a:bodyPr>
+          <a:lstStyle/>
+          <a:p>
+            <a:r>
+              <a:rPr lang="fr-FR" sz="2800" b="1" dirty="0"/>
+              <a:t>Robot Holonome _ New</a:t>
+            </a:r>
+          </a:p>
+        </p:txBody>
+      </p:sp>
+      <p:sp>
+        <p:nvSpPr>
+          <p:cNvPr id="75" name="ZoneTexte 74">
+            <a:extLst>
+              <a:ext uri="{FF2B5EF4-FFF2-40B4-BE49-F238E27FC236}">
+                <a16:creationId xmlns:a16="http://schemas.microsoft.com/office/drawing/2014/main" id="{9900FBC1-3C7F-495D-98E2-7B766A171227}"/>
+              </a:ext>
+            </a:extLst>
+          </p:cNvPr>
+          <p:cNvSpPr txBox="1"/>
+          <p:nvPr/>
+        </p:nvSpPr>
+        <p:spPr>
+          <a:xfrm>
+            <a:off x="9219040" y="173327"/>
+            <a:ext cx="2626731" cy="584775"/>
+          </a:xfrm>
+          <a:prstGeom prst="rect">
+            <a:avLst/>
+          </a:prstGeom>
+          <a:noFill/>
+        </p:spPr>
+        <p:txBody>
+          <a:bodyPr wrap="square" rtlCol="0">
+            <a:spAutoFit/>
+          </a:bodyPr>
+          <a:lstStyle/>
+          <a:p>
+            <a:pPr marL="285750" indent="-285750">
+              <a:buFontTx/>
+              <a:buChar char="-"/>
+            </a:pPr>
+            <a:r>
+              <a:rPr lang="fr-FR" sz="1600" b="1" dirty="0">
+                <a:solidFill>
+                  <a:schemeClr val="accent2"/>
+                </a:solidFill>
+              </a:rPr>
+              <a:t>Contrôleur de lumière</a:t>
+            </a:r>
+          </a:p>
+          <a:p>
+            <a:pPr marL="285750" indent="-285750">
+              <a:buFontTx/>
+              <a:buChar char="-"/>
+            </a:pPr>
+            <a:r>
+              <a:rPr lang="fr-FR" sz="1600" b="1" dirty="0">
+                <a:solidFill>
+                  <a:schemeClr val="accent2"/>
+                </a:solidFill>
+              </a:rPr>
+              <a:t>Communication RF</a:t>
+            </a:r>
+          </a:p>
+        </p:txBody>
+      </p:sp>
+      <p:cxnSp>
+        <p:nvCxnSpPr>
+          <p:cNvPr id="21" name="Connecteur droit 20">
+            <a:extLst>
+              <a:ext uri="{FF2B5EF4-FFF2-40B4-BE49-F238E27FC236}">
+                <a16:creationId xmlns:a16="http://schemas.microsoft.com/office/drawing/2014/main" id="{819D541D-B546-4141-B179-5C156243B3BC}"/>
+              </a:ext>
+            </a:extLst>
+          </p:cNvPr>
+          <p:cNvCxnSpPr/>
+          <p:nvPr/>
+        </p:nvCxnSpPr>
+        <p:spPr>
+          <a:xfrm>
+            <a:off x="355107" y="1363758"/>
+            <a:ext cx="11558726" cy="0"/>
+          </a:xfrm>
+          <a:prstGeom prst="line">
+            <a:avLst/>
+          </a:prstGeom>
+          <a:ln w="19050">
+            <a:solidFill>
+              <a:srgbClr val="002060"/>
+            </a:solidFill>
+          </a:ln>
+        </p:spPr>
+        <p:style>
+          <a:lnRef idx="1">
+            <a:schemeClr val="accent2"/>
+          </a:lnRef>
+          <a:fillRef idx="0">
+            <a:schemeClr val="accent2"/>
+          </a:fillRef>
+          <a:effectRef idx="0">
+            <a:schemeClr val="accent2"/>
+          </a:effectRef>
+          <a:fontRef idx="minor">
+            <a:schemeClr val="tx1"/>
+          </a:fontRef>
+        </p:style>
+      </p:cxnSp>
+      <p:sp>
+        <p:nvSpPr>
+          <p:cNvPr id="23" name="ZoneTexte 22">
+            <a:extLst>
+              <a:ext uri="{FF2B5EF4-FFF2-40B4-BE49-F238E27FC236}">
+                <a16:creationId xmlns:a16="http://schemas.microsoft.com/office/drawing/2014/main" id="{B1275299-DF0B-45A5-9802-401FA64072C2}"/>
+              </a:ext>
+            </a:extLst>
+          </p:cNvPr>
+          <p:cNvSpPr txBox="1"/>
+          <p:nvPr/>
+        </p:nvSpPr>
+        <p:spPr>
+          <a:xfrm>
+            <a:off x="262934" y="754727"/>
+            <a:ext cx="4053610" cy="369332"/>
+          </a:xfrm>
+          <a:prstGeom prst="rect">
+            <a:avLst/>
+          </a:prstGeom>
+          <a:noFill/>
+        </p:spPr>
+        <p:txBody>
+          <a:bodyPr wrap="none" rtlCol="0">
+            <a:spAutoFit/>
+          </a:bodyPr>
+          <a:lstStyle/>
+          <a:p>
+            <a:r>
+              <a:rPr lang="fr-FR" dirty="0">
+                <a:solidFill>
+                  <a:srgbClr val="002060"/>
+                </a:solidFill>
+              </a:rPr>
+              <a:t>Robot Holonome / Moteurs et encodeurs</a:t>
+            </a:r>
+          </a:p>
+        </p:txBody>
+      </p:sp>
+      <p:cxnSp>
+        <p:nvCxnSpPr>
+          <p:cNvPr id="31" name="Connecteur droit 30">
+            <a:extLst>
+              <a:ext uri="{FF2B5EF4-FFF2-40B4-BE49-F238E27FC236}">
+                <a16:creationId xmlns:a16="http://schemas.microsoft.com/office/drawing/2014/main" id="{403E5D90-3502-4F6C-AD7A-7A4E01D26DE6}"/>
+              </a:ext>
+            </a:extLst>
+          </p:cNvPr>
+          <p:cNvCxnSpPr>
+            <a:cxnSpLocks/>
+          </p:cNvCxnSpPr>
+          <p:nvPr/>
+        </p:nvCxnSpPr>
+        <p:spPr>
+          <a:xfrm>
+            <a:off x="355107" y="754727"/>
+            <a:ext cx="7421732" cy="0"/>
+          </a:xfrm>
+          <a:prstGeom prst="line">
+            <a:avLst/>
+          </a:prstGeom>
+          <a:ln w="19050">
+            <a:solidFill>
+              <a:srgbClr val="002060"/>
+            </a:solidFill>
+          </a:ln>
+        </p:spPr>
+        <p:style>
+          <a:lnRef idx="1">
+            <a:schemeClr val="accent2"/>
+          </a:lnRef>
+          <a:fillRef idx="0">
+            <a:schemeClr val="accent2"/>
+          </a:fillRef>
+          <a:effectRef idx="0">
+            <a:schemeClr val="accent2"/>
+          </a:effectRef>
+          <a:fontRef idx="minor">
+            <a:schemeClr val="tx1"/>
+          </a:fontRef>
+        </p:style>
+      </p:cxnSp>
+      <p:sp>
+        <p:nvSpPr>
+          <p:cNvPr id="42" name="Rectangle : coins arrondis 41">
+            <a:extLst>
+              <a:ext uri="{FF2B5EF4-FFF2-40B4-BE49-F238E27FC236}">
+                <a16:creationId xmlns:a16="http://schemas.microsoft.com/office/drawing/2014/main" id="{134E98A0-C0B1-4598-9354-1E69A0310330}"/>
+              </a:ext>
+            </a:extLst>
+          </p:cNvPr>
+          <p:cNvSpPr/>
+          <p:nvPr/>
+        </p:nvSpPr>
+        <p:spPr>
+          <a:xfrm>
+            <a:off x="262934" y="5892290"/>
+            <a:ext cx="1579160" cy="210983"/>
+          </a:xfrm>
+          <a:prstGeom prst="roundRect">
+            <a:avLst/>
+          </a:prstGeom>
+        </p:spPr>
+        <p:style>
+          <a:lnRef idx="2">
+            <a:schemeClr val="accent1">
+              <a:shade val="50000"/>
+            </a:schemeClr>
+          </a:lnRef>
+          <a:fillRef idx="1">
+            <a:schemeClr val="accent1"/>
+          </a:fillRef>
+          <a:effectRef idx="0">
+            <a:schemeClr val="accent1"/>
+          </a:effectRef>
+          <a:fontRef idx="minor">
+            <a:schemeClr val="lt1"/>
+          </a:fontRef>
+        </p:style>
+        <p:txBody>
+          <a:bodyPr rtlCol="0" anchor="ctr"/>
+          <a:lstStyle/>
+          <a:p>
+            <a:pPr algn="ctr"/>
+            <a:r>
+              <a:rPr lang="fr-FR" sz="1000" dirty="0"/>
+              <a:t>Sortie Numérique</a:t>
+            </a:r>
+          </a:p>
+        </p:txBody>
+      </p:sp>
+      <p:sp>
+        <p:nvSpPr>
+          <p:cNvPr id="43" name="Rectangle : coins arrondis 42">
+            <a:extLst>
+              <a:ext uri="{FF2B5EF4-FFF2-40B4-BE49-F238E27FC236}">
+                <a16:creationId xmlns:a16="http://schemas.microsoft.com/office/drawing/2014/main" id="{5824E6DD-5797-4AAB-8A2D-F5A1D6988BBE}"/>
+              </a:ext>
+            </a:extLst>
+          </p:cNvPr>
+          <p:cNvSpPr/>
+          <p:nvPr/>
+        </p:nvSpPr>
+        <p:spPr>
+          <a:xfrm>
+            <a:off x="262934" y="6159992"/>
+            <a:ext cx="1579160" cy="210983"/>
+          </a:xfrm>
+          <a:prstGeom prst="roundRect">
+            <a:avLst/>
+          </a:prstGeom>
+          <a:solidFill>
+            <a:schemeClr val="accent2"/>
+          </a:solidFill>
+        </p:spPr>
+        <p:style>
+          <a:lnRef idx="2">
+            <a:schemeClr val="accent1">
+              <a:shade val="50000"/>
+            </a:schemeClr>
+          </a:lnRef>
+          <a:fillRef idx="1">
+            <a:schemeClr val="accent1"/>
+          </a:fillRef>
+          <a:effectRef idx="0">
+            <a:schemeClr val="accent1"/>
+          </a:effectRef>
+          <a:fontRef idx="minor">
+            <a:schemeClr val="lt1"/>
+          </a:fontRef>
+        </p:style>
+        <p:txBody>
+          <a:bodyPr rtlCol="0" anchor="ctr"/>
+          <a:lstStyle/>
+          <a:p>
+            <a:pPr algn="ctr"/>
+            <a:r>
+              <a:rPr lang="fr-FR" sz="1000" dirty="0"/>
+              <a:t>Entrée Numérique</a:t>
+            </a:r>
+          </a:p>
+        </p:txBody>
+      </p:sp>
+      <p:sp>
+        <p:nvSpPr>
+          <p:cNvPr id="50" name="Rectangle : coins arrondis 49">
+            <a:extLst>
+              <a:ext uri="{FF2B5EF4-FFF2-40B4-BE49-F238E27FC236}">
+                <a16:creationId xmlns:a16="http://schemas.microsoft.com/office/drawing/2014/main" id="{DCA9E179-FAD4-47C8-BACD-7AA435C4043D}"/>
+              </a:ext>
+            </a:extLst>
+          </p:cNvPr>
+          <p:cNvSpPr/>
+          <p:nvPr/>
+        </p:nvSpPr>
+        <p:spPr>
+          <a:xfrm>
+            <a:off x="262934" y="6419748"/>
+            <a:ext cx="1579160" cy="210983"/>
+          </a:xfrm>
+          <a:prstGeom prst="roundRect">
+            <a:avLst/>
+          </a:prstGeom>
+          <a:solidFill>
+            <a:schemeClr val="accent6"/>
+          </a:solidFill>
+        </p:spPr>
+        <p:style>
+          <a:lnRef idx="2">
+            <a:schemeClr val="accent1">
+              <a:shade val="50000"/>
+            </a:schemeClr>
+          </a:lnRef>
+          <a:fillRef idx="1">
+            <a:schemeClr val="accent1"/>
+          </a:fillRef>
+          <a:effectRef idx="0">
+            <a:schemeClr val="accent1"/>
+          </a:effectRef>
+          <a:fontRef idx="minor">
+            <a:schemeClr val="lt1"/>
+          </a:fontRef>
+        </p:style>
+        <p:txBody>
+          <a:bodyPr rtlCol="0" anchor="ctr"/>
+          <a:lstStyle/>
+          <a:p>
+            <a:pPr algn="ctr"/>
+            <a:r>
+              <a:rPr lang="fr-FR" sz="1000" dirty="0"/>
+              <a:t>Entrée Analogique</a:t>
+            </a:r>
+          </a:p>
+        </p:txBody>
+      </p:sp>
+      <p:sp>
+        <p:nvSpPr>
+          <p:cNvPr id="27" name="Rectangle : coins arrondis 26">
+            <a:extLst>
+              <a:ext uri="{FF2B5EF4-FFF2-40B4-BE49-F238E27FC236}">
+                <a16:creationId xmlns:a16="http://schemas.microsoft.com/office/drawing/2014/main" id="{9D4A843D-8297-4576-89AA-61FC550ACB2B}"/>
+              </a:ext>
+            </a:extLst>
+          </p:cNvPr>
+          <p:cNvSpPr/>
+          <p:nvPr/>
+        </p:nvSpPr>
+        <p:spPr>
+          <a:xfrm>
+            <a:off x="3811119" y="1654175"/>
+            <a:ext cx="772357" cy="1412698"/>
+          </a:xfrm>
+          <a:prstGeom prst="roundRect">
+            <a:avLst/>
+          </a:prstGeom>
+          <a:solidFill>
+            <a:schemeClr val="accent5">
+              <a:lumMod val="20000"/>
+              <a:lumOff val="80000"/>
+            </a:schemeClr>
+          </a:solidFill>
+        </p:spPr>
+        <p:style>
+          <a:lnRef idx="2">
+            <a:schemeClr val="accent1">
+              <a:shade val="50000"/>
+            </a:schemeClr>
+          </a:lnRef>
+          <a:fillRef idx="1">
+            <a:schemeClr val="accent1"/>
+          </a:fillRef>
+          <a:effectRef idx="0">
+            <a:schemeClr val="accent1"/>
+          </a:effectRef>
+          <a:fontRef idx="minor">
+            <a:schemeClr val="lt1"/>
+          </a:fontRef>
+        </p:style>
+        <p:txBody>
+          <a:bodyPr vert="vert270" rtlCol="0" anchor="ctr"/>
+          <a:lstStyle/>
+          <a:p>
+            <a:pPr algn="ctr"/>
+            <a:r>
+              <a:rPr lang="fr-FR" dirty="0">
+                <a:solidFill>
+                  <a:schemeClr val="bg1">
+                    <a:lumMod val="50000"/>
+                  </a:schemeClr>
+                </a:solidFill>
+              </a:rPr>
+              <a:t>Moteur 2</a:t>
+            </a:r>
+          </a:p>
+        </p:txBody>
+      </p:sp>
+      <p:sp>
+        <p:nvSpPr>
+          <p:cNvPr id="36" name="Rectangle : coins arrondis 35">
+            <a:extLst>
+              <a:ext uri="{FF2B5EF4-FFF2-40B4-BE49-F238E27FC236}">
+                <a16:creationId xmlns:a16="http://schemas.microsoft.com/office/drawing/2014/main" id="{95F13365-2552-40ED-BB27-BFA7BBB220B5}"/>
+              </a:ext>
+            </a:extLst>
+          </p:cNvPr>
+          <p:cNvSpPr/>
+          <p:nvPr/>
+        </p:nvSpPr>
+        <p:spPr>
+          <a:xfrm>
+            <a:off x="2240441" y="3296155"/>
+            <a:ext cx="184619" cy="569212"/>
+          </a:xfrm>
+          <a:prstGeom prst="roundRect">
+            <a:avLst/>
+          </a:prstGeom>
+          <a:solidFill>
+            <a:schemeClr val="bg1"/>
+          </a:solidFill>
+          <a:ln>
+            <a:solidFill>
+              <a:schemeClr val="tx1"/>
+            </a:solidFill>
+          </a:ln>
+        </p:spPr>
+        <p:style>
+          <a:lnRef idx="2">
+            <a:schemeClr val="accent1">
+              <a:shade val="50000"/>
+            </a:schemeClr>
+          </a:lnRef>
+          <a:fillRef idx="1">
+            <a:schemeClr val="accent1"/>
+          </a:fillRef>
+          <a:effectRef idx="0">
+            <a:schemeClr val="accent1"/>
+          </a:effectRef>
+          <a:fontRef idx="minor">
+            <a:schemeClr val="lt1"/>
+          </a:fontRef>
+        </p:style>
+        <p:txBody>
+          <a:bodyPr vert="vert270" rtlCol="0" anchor="ctr"/>
+          <a:lstStyle/>
+          <a:p>
+            <a:pPr algn="ctr"/>
+            <a:r>
+              <a:rPr lang="fr-FR" sz="1400" dirty="0">
+                <a:solidFill>
+                  <a:schemeClr val="tx1"/>
+                </a:solidFill>
+              </a:rPr>
+              <a:t>PWM</a:t>
+            </a:r>
+          </a:p>
+        </p:txBody>
+      </p:sp>
+      <p:sp>
+        <p:nvSpPr>
+          <p:cNvPr id="40" name="Rectangle : coins arrondis 39">
+            <a:extLst>
+              <a:ext uri="{FF2B5EF4-FFF2-40B4-BE49-F238E27FC236}">
+                <a16:creationId xmlns:a16="http://schemas.microsoft.com/office/drawing/2014/main" id="{3F796F1C-A788-42B5-B8EF-CA6FD1A87536}"/>
+              </a:ext>
+            </a:extLst>
+          </p:cNvPr>
+          <p:cNvSpPr/>
+          <p:nvPr/>
+        </p:nvSpPr>
+        <p:spPr>
+          <a:xfrm>
+            <a:off x="3160557" y="2834237"/>
+            <a:ext cx="772357" cy="148656"/>
+          </a:xfrm>
+          <a:prstGeom prst="roundRect">
+            <a:avLst/>
+          </a:prstGeom>
+          <a:solidFill>
+            <a:srgbClr val="4472C4"/>
+          </a:solidFill>
+        </p:spPr>
+        <p:style>
+          <a:lnRef idx="2">
+            <a:schemeClr val="accent1">
+              <a:shade val="50000"/>
+            </a:schemeClr>
+          </a:lnRef>
+          <a:fillRef idx="1">
+            <a:schemeClr val="accent1"/>
+          </a:fillRef>
+          <a:effectRef idx="0">
+            <a:schemeClr val="accent1"/>
+          </a:effectRef>
+          <a:fontRef idx="minor">
+            <a:schemeClr val="lt1"/>
+          </a:fontRef>
+        </p:style>
+        <p:txBody>
+          <a:bodyPr rtlCol="0" anchor="ctr"/>
+          <a:lstStyle/>
+          <a:p>
+            <a:pPr algn="ctr"/>
+            <a:r>
+              <a:rPr lang="fr-FR" sz="1100" dirty="0"/>
+              <a:t>M2_B</a:t>
+            </a:r>
+          </a:p>
+        </p:txBody>
+      </p:sp>
+      <p:sp>
+        <p:nvSpPr>
+          <p:cNvPr id="52" name="Rectangle : coins arrondis 51">
+            <a:extLst>
+              <a:ext uri="{FF2B5EF4-FFF2-40B4-BE49-F238E27FC236}">
+                <a16:creationId xmlns:a16="http://schemas.microsoft.com/office/drawing/2014/main" id="{E70E144E-F0F4-4A82-9EB0-73E99AF700E6}"/>
+              </a:ext>
+            </a:extLst>
+          </p:cNvPr>
+          <p:cNvSpPr/>
+          <p:nvPr/>
+        </p:nvSpPr>
+        <p:spPr>
+          <a:xfrm>
+            <a:off x="3160556" y="2645863"/>
+            <a:ext cx="772357" cy="148656"/>
+          </a:xfrm>
+          <a:prstGeom prst="roundRect">
+            <a:avLst/>
+          </a:prstGeom>
+          <a:solidFill>
+            <a:schemeClr val="accent1"/>
+          </a:solidFill>
+        </p:spPr>
+        <p:style>
+          <a:lnRef idx="2">
+            <a:schemeClr val="accent1">
+              <a:shade val="50000"/>
+            </a:schemeClr>
+          </a:lnRef>
+          <a:fillRef idx="1">
+            <a:schemeClr val="accent1"/>
+          </a:fillRef>
+          <a:effectRef idx="0">
+            <a:schemeClr val="accent1"/>
+          </a:effectRef>
+          <a:fontRef idx="minor">
+            <a:schemeClr val="lt1"/>
+          </a:fontRef>
+        </p:style>
+        <p:txBody>
+          <a:bodyPr rtlCol="0" anchor="ctr"/>
+          <a:lstStyle/>
+          <a:p>
+            <a:pPr algn="ctr"/>
+            <a:r>
+              <a:rPr lang="fr-FR" sz="1100" dirty="0"/>
+              <a:t>M2_A</a:t>
+            </a:r>
+          </a:p>
+        </p:txBody>
+      </p:sp>
+      <p:sp>
+        <p:nvSpPr>
+          <p:cNvPr id="80" name="Rectangle : coins arrondis 79">
+            <a:extLst>
+              <a:ext uri="{FF2B5EF4-FFF2-40B4-BE49-F238E27FC236}">
+                <a16:creationId xmlns:a16="http://schemas.microsoft.com/office/drawing/2014/main" id="{64669771-63F0-4ECF-ADA0-F626A6523D08}"/>
+              </a:ext>
+            </a:extLst>
+          </p:cNvPr>
+          <p:cNvSpPr/>
+          <p:nvPr/>
+        </p:nvSpPr>
+        <p:spPr>
+          <a:xfrm>
+            <a:off x="3160556" y="2185903"/>
+            <a:ext cx="772357" cy="148656"/>
+          </a:xfrm>
+          <a:prstGeom prst="roundRect">
+            <a:avLst/>
+          </a:prstGeom>
+          <a:solidFill>
+            <a:schemeClr val="tx1"/>
+          </a:solidFill>
+        </p:spPr>
+        <p:style>
+          <a:lnRef idx="2">
+            <a:schemeClr val="accent1">
+              <a:shade val="50000"/>
+            </a:schemeClr>
+          </a:lnRef>
+          <a:fillRef idx="1">
+            <a:schemeClr val="accent1"/>
+          </a:fillRef>
+          <a:effectRef idx="0">
+            <a:schemeClr val="accent1"/>
+          </a:effectRef>
+          <a:fontRef idx="minor">
+            <a:schemeClr val="lt1"/>
+          </a:fontRef>
+        </p:style>
+        <p:txBody>
+          <a:bodyPr rtlCol="0" anchor="ctr"/>
+          <a:lstStyle/>
+          <a:p>
+            <a:pPr algn="ctr"/>
+            <a:r>
+              <a:rPr lang="fr-FR" sz="1100" dirty="0"/>
+              <a:t>GND</a:t>
+            </a:r>
+          </a:p>
+        </p:txBody>
+      </p:sp>
+      <p:sp>
+        <p:nvSpPr>
+          <p:cNvPr id="81" name="Rectangle : coins arrondis 80">
+            <a:extLst>
+              <a:ext uri="{FF2B5EF4-FFF2-40B4-BE49-F238E27FC236}">
+                <a16:creationId xmlns:a16="http://schemas.microsoft.com/office/drawing/2014/main" id="{F407DFD6-70D6-4B02-94CF-E54582524E31}"/>
+              </a:ext>
+            </a:extLst>
+          </p:cNvPr>
+          <p:cNvSpPr/>
+          <p:nvPr/>
+        </p:nvSpPr>
+        <p:spPr>
+          <a:xfrm>
+            <a:off x="3160555" y="2370762"/>
+            <a:ext cx="772357" cy="148656"/>
+          </a:xfrm>
+          <a:prstGeom prst="roundRect">
+            <a:avLst/>
+          </a:prstGeom>
+          <a:solidFill>
+            <a:srgbClr val="FF0000"/>
+          </a:solidFill>
+        </p:spPr>
+        <p:style>
+          <a:lnRef idx="2">
+            <a:schemeClr val="accent1">
+              <a:shade val="50000"/>
+            </a:schemeClr>
+          </a:lnRef>
+          <a:fillRef idx="1">
+            <a:schemeClr val="accent1"/>
+          </a:fillRef>
+          <a:effectRef idx="0">
+            <a:schemeClr val="accent1"/>
+          </a:effectRef>
+          <a:fontRef idx="minor">
+            <a:schemeClr val="lt1"/>
+          </a:fontRef>
+        </p:style>
+        <p:txBody>
+          <a:bodyPr rtlCol="0" anchor="ctr"/>
+          <a:lstStyle/>
+          <a:p>
+            <a:pPr algn="ctr"/>
+            <a:r>
+              <a:rPr lang="fr-FR" sz="1100" dirty="0"/>
+              <a:t>3.3V</a:t>
+            </a:r>
+          </a:p>
+        </p:txBody>
+      </p:sp>
+      <p:sp>
+        <p:nvSpPr>
+          <p:cNvPr id="10" name="Rectangle : coins arrondis 9">
+            <a:extLst>
+              <a:ext uri="{FF2B5EF4-FFF2-40B4-BE49-F238E27FC236}">
+                <a16:creationId xmlns:a16="http://schemas.microsoft.com/office/drawing/2014/main" id="{864264D9-63AE-DCA2-FDE4-DEF40B695E77}"/>
+              </a:ext>
+            </a:extLst>
+          </p:cNvPr>
+          <p:cNvSpPr/>
+          <p:nvPr/>
+        </p:nvSpPr>
+        <p:spPr>
+          <a:xfrm>
+            <a:off x="3160555" y="1903624"/>
+            <a:ext cx="772357" cy="148656"/>
+          </a:xfrm>
+          <a:prstGeom prst="roundRect">
+            <a:avLst/>
+          </a:prstGeom>
+          <a:solidFill>
+            <a:srgbClr val="7F7F7F"/>
+          </a:solidFill>
+        </p:spPr>
+        <p:style>
+          <a:lnRef idx="2">
+            <a:schemeClr val="accent1">
+              <a:shade val="50000"/>
+            </a:schemeClr>
+          </a:lnRef>
+          <a:fillRef idx="1">
+            <a:schemeClr val="accent1"/>
+          </a:fillRef>
+          <a:effectRef idx="0">
+            <a:schemeClr val="accent1"/>
+          </a:effectRef>
+          <a:fontRef idx="minor">
+            <a:schemeClr val="lt1"/>
+          </a:fontRef>
+        </p:style>
+        <p:txBody>
+          <a:bodyPr rtlCol="0" anchor="ctr"/>
+          <a:lstStyle/>
+          <a:p>
+            <a:pPr algn="ctr"/>
+            <a:r>
+              <a:rPr lang="fr-FR" sz="1100" dirty="0"/>
+              <a:t>M2 -</a:t>
+            </a:r>
+          </a:p>
+        </p:txBody>
+      </p:sp>
+      <p:sp>
+        <p:nvSpPr>
+          <p:cNvPr id="11" name="Rectangle : coins arrondis 10">
+            <a:extLst>
+              <a:ext uri="{FF2B5EF4-FFF2-40B4-BE49-F238E27FC236}">
+                <a16:creationId xmlns:a16="http://schemas.microsoft.com/office/drawing/2014/main" id="{4E8F2E04-B5F1-151C-0722-D4E6A9360CD2}"/>
+              </a:ext>
+            </a:extLst>
+          </p:cNvPr>
+          <p:cNvSpPr/>
+          <p:nvPr/>
+        </p:nvSpPr>
+        <p:spPr>
+          <a:xfrm>
+            <a:off x="3160554" y="1715250"/>
+            <a:ext cx="772357" cy="148656"/>
+          </a:xfrm>
+          <a:prstGeom prst="roundRect">
+            <a:avLst/>
+          </a:prstGeom>
+          <a:solidFill>
+            <a:srgbClr val="7F7F7F"/>
+          </a:solidFill>
+        </p:spPr>
+        <p:style>
+          <a:lnRef idx="2">
+            <a:schemeClr val="accent1">
+              <a:shade val="50000"/>
+            </a:schemeClr>
+          </a:lnRef>
+          <a:fillRef idx="1">
+            <a:schemeClr val="accent1"/>
+          </a:fillRef>
+          <a:effectRef idx="0">
+            <a:schemeClr val="accent1"/>
+          </a:effectRef>
+          <a:fontRef idx="minor">
+            <a:schemeClr val="lt1"/>
+          </a:fontRef>
+        </p:style>
+        <p:txBody>
+          <a:bodyPr rtlCol="0" anchor="ctr"/>
+          <a:lstStyle/>
+          <a:p>
+            <a:pPr algn="ctr"/>
+            <a:r>
+              <a:rPr lang="fr-FR" sz="1100" dirty="0"/>
+              <a:t>M2 +</a:t>
+            </a:r>
+          </a:p>
+        </p:txBody>
+      </p:sp>
+      <p:sp>
+        <p:nvSpPr>
+          <p:cNvPr id="13" name="Rectangle : coins arrondis 12">
+            <a:extLst>
+              <a:ext uri="{FF2B5EF4-FFF2-40B4-BE49-F238E27FC236}">
+                <a16:creationId xmlns:a16="http://schemas.microsoft.com/office/drawing/2014/main" id="{EFABFCB3-8AB7-D9CB-E9F2-A16A5A5314EB}"/>
+              </a:ext>
+            </a:extLst>
+          </p:cNvPr>
+          <p:cNvSpPr/>
+          <p:nvPr/>
+        </p:nvSpPr>
+        <p:spPr>
+          <a:xfrm>
+            <a:off x="3839694" y="3324625"/>
+            <a:ext cx="772357" cy="1412698"/>
+          </a:xfrm>
+          <a:prstGeom prst="roundRect">
+            <a:avLst/>
+          </a:prstGeom>
+          <a:solidFill>
+            <a:schemeClr val="accent5">
+              <a:lumMod val="20000"/>
+              <a:lumOff val="80000"/>
+            </a:schemeClr>
+          </a:solidFill>
+        </p:spPr>
+        <p:style>
+          <a:lnRef idx="2">
+            <a:schemeClr val="accent1">
+              <a:shade val="50000"/>
+            </a:schemeClr>
+          </a:lnRef>
+          <a:fillRef idx="1">
+            <a:schemeClr val="accent1"/>
+          </a:fillRef>
+          <a:effectRef idx="0">
+            <a:schemeClr val="accent1"/>
+          </a:effectRef>
+          <a:fontRef idx="minor">
+            <a:schemeClr val="lt1"/>
+          </a:fontRef>
+        </p:style>
+        <p:txBody>
+          <a:bodyPr vert="vert270" rtlCol="0" anchor="ctr"/>
+          <a:lstStyle/>
+          <a:p>
+            <a:pPr algn="ctr"/>
+            <a:r>
+              <a:rPr lang="fr-FR" dirty="0">
+                <a:solidFill>
+                  <a:schemeClr val="bg1">
+                    <a:lumMod val="50000"/>
+                  </a:schemeClr>
+                </a:solidFill>
+              </a:rPr>
+              <a:t>Moteur 3</a:t>
+            </a:r>
+          </a:p>
+        </p:txBody>
+      </p:sp>
+      <p:sp>
+        <p:nvSpPr>
+          <p:cNvPr id="14" name="Rectangle : coins arrondis 13">
+            <a:extLst>
+              <a:ext uri="{FF2B5EF4-FFF2-40B4-BE49-F238E27FC236}">
+                <a16:creationId xmlns:a16="http://schemas.microsoft.com/office/drawing/2014/main" id="{240FD17B-8266-7A65-4A33-A5149978A9E4}"/>
+              </a:ext>
+            </a:extLst>
+          </p:cNvPr>
+          <p:cNvSpPr/>
+          <p:nvPr/>
+        </p:nvSpPr>
+        <p:spPr>
+          <a:xfrm>
+            <a:off x="3189132" y="4504687"/>
+            <a:ext cx="772357" cy="148656"/>
+          </a:xfrm>
+          <a:prstGeom prst="roundRect">
+            <a:avLst/>
+          </a:prstGeom>
+          <a:solidFill>
+            <a:srgbClr val="4472C4"/>
+          </a:solidFill>
+        </p:spPr>
+        <p:style>
+          <a:lnRef idx="2">
+            <a:schemeClr val="accent1">
+              <a:shade val="50000"/>
+            </a:schemeClr>
+          </a:lnRef>
+          <a:fillRef idx="1">
+            <a:schemeClr val="accent1"/>
+          </a:fillRef>
+          <a:effectRef idx="0">
+            <a:schemeClr val="accent1"/>
+          </a:effectRef>
+          <a:fontRef idx="minor">
+            <a:schemeClr val="lt1"/>
+          </a:fontRef>
+        </p:style>
+        <p:txBody>
+          <a:bodyPr rtlCol="0" anchor="ctr"/>
+          <a:lstStyle/>
+          <a:p>
+            <a:pPr algn="ctr"/>
+            <a:r>
+              <a:rPr lang="fr-FR" sz="1100" dirty="0"/>
+              <a:t>M3_B</a:t>
+            </a:r>
+          </a:p>
+        </p:txBody>
+      </p:sp>
+      <p:sp>
+        <p:nvSpPr>
+          <p:cNvPr id="15" name="Rectangle : coins arrondis 14">
+            <a:extLst>
+              <a:ext uri="{FF2B5EF4-FFF2-40B4-BE49-F238E27FC236}">
+                <a16:creationId xmlns:a16="http://schemas.microsoft.com/office/drawing/2014/main" id="{132D3B36-4533-C6BC-BC3E-1DD886A39CAA}"/>
+              </a:ext>
+            </a:extLst>
+          </p:cNvPr>
+          <p:cNvSpPr/>
+          <p:nvPr/>
+        </p:nvSpPr>
+        <p:spPr>
+          <a:xfrm>
+            <a:off x="3189131" y="4316313"/>
+            <a:ext cx="772357" cy="148656"/>
+          </a:xfrm>
+          <a:prstGeom prst="roundRect">
+            <a:avLst/>
+          </a:prstGeom>
+          <a:solidFill>
+            <a:schemeClr val="accent1"/>
+          </a:solidFill>
+        </p:spPr>
+        <p:style>
+          <a:lnRef idx="2">
+            <a:schemeClr val="accent1">
+              <a:shade val="50000"/>
+            </a:schemeClr>
+          </a:lnRef>
+          <a:fillRef idx="1">
+            <a:schemeClr val="accent1"/>
+          </a:fillRef>
+          <a:effectRef idx="0">
+            <a:schemeClr val="accent1"/>
+          </a:effectRef>
+          <a:fontRef idx="minor">
+            <a:schemeClr val="lt1"/>
+          </a:fontRef>
+        </p:style>
+        <p:txBody>
+          <a:bodyPr rtlCol="0" anchor="ctr"/>
+          <a:lstStyle/>
+          <a:p>
+            <a:pPr algn="ctr"/>
+            <a:r>
+              <a:rPr lang="fr-FR" sz="1100" dirty="0"/>
+              <a:t>M3_A</a:t>
+            </a:r>
+          </a:p>
+        </p:txBody>
+      </p:sp>
+      <p:sp>
+        <p:nvSpPr>
+          <p:cNvPr id="16" name="Rectangle : coins arrondis 15">
+            <a:extLst>
+              <a:ext uri="{FF2B5EF4-FFF2-40B4-BE49-F238E27FC236}">
+                <a16:creationId xmlns:a16="http://schemas.microsoft.com/office/drawing/2014/main" id="{A8377F53-0648-DE84-0825-3C06B6833E42}"/>
+              </a:ext>
+            </a:extLst>
+          </p:cNvPr>
+          <p:cNvSpPr/>
+          <p:nvPr/>
+        </p:nvSpPr>
+        <p:spPr>
+          <a:xfrm>
+            <a:off x="3189131" y="3856353"/>
+            <a:ext cx="772357" cy="148656"/>
+          </a:xfrm>
+          <a:prstGeom prst="roundRect">
+            <a:avLst/>
+          </a:prstGeom>
+          <a:solidFill>
+            <a:schemeClr val="tx1"/>
+          </a:solidFill>
+        </p:spPr>
+        <p:style>
+          <a:lnRef idx="2">
+            <a:schemeClr val="accent1">
+              <a:shade val="50000"/>
+            </a:schemeClr>
+          </a:lnRef>
+          <a:fillRef idx="1">
+            <a:schemeClr val="accent1"/>
+          </a:fillRef>
+          <a:effectRef idx="0">
+            <a:schemeClr val="accent1"/>
+          </a:effectRef>
+          <a:fontRef idx="minor">
+            <a:schemeClr val="lt1"/>
+          </a:fontRef>
+        </p:style>
+        <p:txBody>
+          <a:bodyPr rtlCol="0" anchor="ctr"/>
+          <a:lstStyle/>
+          <a:p>
+            <a:pPr algn="ctr"/>
+            <a:r>
+              <a:rPr lang="fr-FR" sz="1100" dirty="0"/>
+              <a:t>GND</a:t>
+            </a:r>
+          </a:p>
+        </p:txBody>
+      </p:sp>
+      <p:sp>
+        <p:nvSpPr>
+          <p:cNvPr id="17" name="Rectangle : coins arrondis 16">
+            <a:extLst>
+              <a:ext uri="{FF2B5EF4-FFF2-40B4-BE49-F238E27FC236}">
+                <a16:creationId xmlns:a16="http://schemas.microsoft.com/office/drawing/2014/main" id="{859FC7C7-8640-304A-E022-128A675BC3DD}"/>
+              </a:ext>
+            </a:extLst>
+          </p:cNvPr>
+          <p:cNvSpPr/>
+          <p:nvPr/>
+        </p:nvSpPr>
+        <p:spPr>
+          <a:xfrm>
+            <a:off x="3189130" y="4041212"/>
+            <a:ext cx="772357" cy="148656"/>
+          </a:xfrm>
+          <a:prstGeom prst="roundRect">
+            <a:avLst/>
+          </a:prstGeom>
+          <a:solidFill>
+            <a:srgbClr val="FF0000"/>
+          </a:solidFill>
+        </p:spPr>
+        <p:style>
+          <a:lnRef idx="2">
+            <a:schemeClr val="accent1">
+              <a:shade val="50000"/>
+            </a:schemeClr>
+          </a:lnRef>
+          <a:fillRef idx="1">
+            <a:schemeClr val="accent1"/>
+          </a:fillRef>
+          <a:effectRef idx="0">
+            <a:schemeClr val="accent1"/>
+          </a:effectRef>
+          <a:fontRef idx="minor">
+            <a:schemeClr val="lt1"/>
+          </a:fontRef>
+        </p:style>
+        <p:txBody>
+          <a:bodyPr rtlCol="0" anchor="ctr"/>
+          <a:lstStyle/>
+          <a:p>
+            <a:pPr algn="ctr"/>
+            <a:r>
+              <a:rPr lang="fr-FR" sz="1100" dirty="0"/>
+              <a:t>3.3V</a:t>
+            </a:r>
+          </a:p>
+        </p:txBody>
+      </p:sp>
+      <p:sp>
+        <p:nvSpPr>
+          <p:cNvPr id="18" name="Rectangle : coins arrondis 17">
+            <a:extLst>
+              <a:ext uri="{FF2B5EF4-FFF2-40B4-BE49-F238E27FC236}">
+                <a16:creationId xmlns:a16="http://schemas.microsoft.com/office/drawing/2014/main" id="{B370F742-0700-E19E-736B-F9B6B9C50064}"/>
+              </a:ext>
+            </a:extLst>
+          </p:cNvPr>
+          <p:cNvSpPr/>
+          <p:nvPr/>
+        </p:nvSpPr>
+        <p:spPr>
+          <a:xfrm>
+            <a:off x="3189130" y="3574074"/>
+            <a:ext cx="772357" cy="148656"/>
+          </a:xfrm>
+          <a:prstGeom prst="roundRect">
+            <a:avLst/>
+          </a:prstGeom>
+          <a:solidFill>
+            <a:srgbClr val="7F7F7F"/>
+          </a:solidFill>
+        </p:spPr>
+        <p:style>
+          <a:lnRef idx="2">
+            <a:schemeClr val="accent1">
+              <a:shade val="50000"/>
+            </a:schemeClr>
+          </a:lnRef>
+          <a:fillRef idx="1">
+            <a:schemeClr val="accent1"/>
+          </a:fillRef>
+          <a:effectRef idx="0">
+            <a:schemeClr val="accent1"/>
+          </a:effectRef>
+          <a:fontRef idx="minor">
+            <a:schemeClr val="lt1"/>
+          </a:fontRef>
+        </p:style>
+        <p:txBody>
+          <a:bodyPr rtlCol="0" anchor="ctr"/>
+          <a:lstStyle/>
+          <a:p>
+            <a:pPr algn="ctr"/>
+            <a:r>
+              <a:rPr lang="fr-FR" sz="1100" dirty="0"/>
+              <a:t>M3 -</a:t>
+            </a:r>
+          </a:p>
+        </p:txBody>
+      </p:sp>
+      <p:sp>
+        <p:nvSpPr>
+          <p:cNvPr id="19" name="Rectangle : coins arrondis 18">
+            <a:extLst>
+              <a:ext uri="{FF2B5EF4-FFF2-40B4-BE49-F238E27FC236}">
+                <a16:creationId xmlns:a16="http://schemas.microsoft.com/office/drawing/2014/main" id="{0C6766B2-98E5-703B-CD61-AAE0C1E2A2CA}"/>
+              </a:ext>
+            </a:extLst>
+          </p:cNvPr>
+          <p:cNvSpPr/>
+          <p:nvPr/>
+        </p:nvSpPr>
+        <p:spPr>
+          <a:xfrm>
+            <a:off x="3189129" y="3385700"/>
+            <a:ext cx="772357" cy="148656"/>
+          </a:xfrm>
+          <a:prstGeom prst="roundRect">
+            <a:avLst/>
+          </a:prstGeom>
+          <a:solidFill>
+            <a:srgbClr val="7F7F7F"/>
+          </a:solidFill>
+        </p:spPr>
+        <p:style>
+          <a:lnRef idx="2">
+            <a:schemeClr val="accent1">
+              <a:shade val="50000"/>
+            </a:schemeClr>
+          </a:lnRef>
+          <a:fillRef idx="1">
+            <a:schemeClr val="accent1"/>
+          </a:fillRef>
+          <a:effectRef idx="0">
+            <a:schemeClr val="accent1"/>
+          </a:effectRef>
+          <a:fontRef idx="minor">
+            <a:schemeClr val="lt1"/>
+          </a:fontRef>
+        </p:style>
+        <p:txBody>
+          <a:bodyPr rtlCol="0" anchor="ctr"/>
+          <a:lstStyle/>
+          <a:p>
+            <a:pPr algn="ctr"/>
+            <a:r>
+              <a:rPr lang="fr-FR" sz="1100" dirty="0"/>
+              <a:t>M3 +</a:t>
+            </a:r>
+          </a:p>
+        </p:txBody>
+      </p:sp>
+      <p:sp>
+        <p:nvSpPr>
+          <p:cNvPr id="102" name="Rectangle : coins arrondis 101">
+            <a:extLst>
+              <a:ext uri="{FF2B5EF4-FFF2-40B4-BE49-F238E27FC236}">
+                <a16:creationId xmlns:a16="http://schemas.microsoft.com/office/drawing/2014/main" id="{913B8B4A-06E9-5361-99B2-610CF4C024DA}"/>
+              </a:ext>
+            </a:extLst>
+          </p:cNvPr>
+          <p:cNvSpPr/>
+          <p:nvPr/>
+        </p:nvSpPr>
+        <p:spPr>
+          <a:xfrm>
+            <a:off x="1240906" y="1892311"/>
+            <a:ext cx="854593" cy="148656"/>
+          </a:xfrm>
+          <a:prstGeom prst="roundRect">
+            <a:avLst/>
+          </a:prstGeom>
+        </p:spPr>
+        <p:style>
+          <a:lnRef idx="2">
+            <a:schemeClr val="accent1">
+              <a:shade val="50000"/>
+            </a:schemeClr>
+          </a:lnRef>
+          <a:fillRef idx="1">
+            <a:schemeClr val="accent1"/>
+          </a:fillRef>
+          <a:effectRef idx="0">
+            <a:schemeClr val="accent1"/>
+          </a:effectRef>
+          <a:fontRef idx="minor">
+            <a:schemeClr val="lt1"/>
+          </a:fontRef>
+        </p:style>
+        <p:txBody>
+          <a:bodyPr rtlCol="0" anchor="ctr"/>
+          <a:lstStyle/>
+          <a:p>
+            <a:pPr algn="ctr"/>
+            <a:r>
+              <a:rPr lang="fr-FR" sz="900" dirty="0"/>
+              <a:t>PB_13</a:t>
+            </a:r>
+          </a:p>
+        </p:txBody>
+      </p:sp>
+      <p:sp>
+        <p:nvSpPr>
+          <p:cNvPr id="103" name="Rectangle : coins arrondis 102">
+            <a:extLst>
+              <a:ext uri="{FF2B5EF4-FFF2-40B4-BE49-F238E27FC236}">
+                <a16:creationId xmlns:a16="http://schemas.microsoft.com/office/drawing/2014/main" id="{9107EC1F-B901-7BFC-4663-1CC3F466C82C}"/>
+              </a:ext>
+            </a:extLst>
+          </p:cNvPr>
+          <p:cNvSpPr/>
+          <p:nvPr/>
+        </p:nvSpPr>
+        <p:spPr>
+          <a:xfrm>
+            <a:off x="1240908" y="1696913"/>
+            <a:ext cx="854593" cy="148656"/>
+          </a:xfrm>
+          <a:prstGeom prst="roundRect">
+            <a:avLst/>
+          </a:prstGeom>
+        </p:spPr>
+        <p:style>
+          <a:lnRef idx="2">
+            <a:schemeClr val="accent1">
+              <a:shade val="50000"/>
+            </a:schemeClr>
+          </a:lnRef>
+          <a:fillRef idx="1">
+            <a:schemeClr val="accent1"/>
+          </a:fillRef>
+          <a:effectRef idx="0">
+            <a:schemeClr val="accent1"/>
+          </a:effectRef>
+          <a:fontRef idx="minor">
+            <a:schemeClr val="lt1"/>
+          </a:fontRef>
+        </p:style>
+        <p:txBody>
+          <a:bodyPr rtlCol="0" anchor="ctr"/>
+          <a:lstStyle/>
+          <a:p>
+            <a:pPr algn="ctr"/>
+            <a:r>
+              <a:rPr lang="fr-FR" sz="900" dirty="0"/>
+              <a:t>PB_14</a:t>
+            </a:r>
+          </a:p>
+        </p:txBody>
+      </p:sp>
+      <p:sp>
+        <p:nvSpPr>
+          <p:cNvPr id="106" name="Rectangle : coins arrondis 105">
+            <a:extLst>
+              <a:ext uri="{FF2B5EF4-FFF2-40B4-BE49-F238E27FC236}">
+                <a16:creationId xmlns:a16="http://schemas.microsoft.com/office/drawing/2014/main" id="{51DA2DB8-9E49-C291-DB79-4C9327E93295}"/>
+              </a:ext>
+            </a:extLst>
+          </p:cNvPr>
+          <p:cNvSpPr/>
+          <p:nvPr/>
+        </p:nvSpPr>
+        <p:spPr>
+          <a:xfrm>
+            <a:off x="1240906" y="3586855"/>
+            <a:ext cx="854593" cy="148656"/>
+          </a:xfrm>
+          <a:prstGeom prst="roundRect">
+            <a:avLst/>
+          </a:prstGeom>
+        </p:spPr>
+        <p:style>
+          <a:lnRef idx="2">
+            <a:schemeClr val="accent1">
+              <a:shade val="50000"/>
+            </a:schemeClr>
+          </a:lnRef>
+          <a:fillRef idx="1">
+            <a:schemeClr val="accent1"/>
+          </a:fillRef>
+          <a:effectRef idx="0">
+            <a:schemeClr val="accent1"/>
+          </a:effectRef>
+          <a:fontRef idx="minor">
+            <a:schemeClr val="lt1"/>
+          </a:fontRef>
+        </p:style>
+        <p:txBody>
+          <a:bodyPr rtlCol="0" anchor="ctr"/>
+          <a:lstStyle/>
+          <a:p>
+            <a:pPr algn="ctr"/>
+            <a:r>
+              <a:rPr lang="fr-FR" sz="900" dirty="0"/>
+              <a:t>PC_9</a:t>
+            </a:r>
+          </a:p>
+        </p:txBody>
+      </p:sp>
+      <p:sp>
+        <p:nvSpPr>
+          <p:cNvPr id="107" name="Rectangle : coins arrondis 106">
+            <a:extLst>
+              <a:ext uri="{FF2B5EF4-FFF2-40B4-BE49-F238E27FC236}">
+                <a16:creationId xmlns:a16="http://schemas.microsoft.com/office/drawing/2014/main" id="{6587D86A-C9BA-963C-9FD3-CB8F0AEC7C1E}"/>
+              </a:ext>
+            </a:extLst>
+          </p:cNvPr>
+          <p:cNvSpPr/>
+          <p:nvPr/>
+        </p:nvSpPr>
+        <p:spPr>
+          <a:xfrm>
+            <a:off x="1240908" y="3391457"/>
+            <a:ext cx="854593" cy="148656"/>
+          </a:xfrm>
+          <a:prstGeom prst="roundRect">
+            <a:avLst/>
+          </a:prstGeom>
+        </p:spPr>
+        <p:style>
+          <a:lnRef idx="2">
+            <a:schemeClr val="accent1">
+              <a:shade val="50000"/>
+            </a:schemeClr>
+          </a:lnRef>
+          <a:fillRef idx="1">
+            <a:schemeClr val="accent1"/>
+          </a:fillRef>
+          <a:effectRef idx="0">
+            <a:schemeClr val="accent1"/>
+          </a:effectRef>
+          <a:fontRef idx="minor">
+            <a:schemeClr val="lt1"/>
+          </a:fontRef>
+        </p:style>
+        <p:txBody>
+          <a:bodyPr rtlCol="0" anchor="ctr"/>
+          <a:lstStyle/>
+          <a:p>
+            <a:pPr algn="ctr"/>
+            <a:r>
+              <a:rPr lang="fr-FR" sz="900" dirty="0"/>
+              <a:t>PB_8</a:t>
+            </a:r>
+          </a:p>
+        </p:txBody>
+      </p:sp>
+      <p:sp>
+        <p:nvSpPr>
+          <p:cNvPr id="110" name="Rectangle : coins arrondis 109">
+            <a:extLst>
+              <a:ext uri="{FF2B5EF4-FFF2-40B4-BE49-F238E27FC236}">
+                <a16:creationId xmlns:a16="http://schemas.microsoft.com/office/drawing/2014/main" id="{07571AAE-7ECF-1C97-382A-44B32E9BA441}"/>
+              </a:ext>
+            </a:extLst>
+          </p:cNvPr>
+          <p:cNvSpPr/>
+          <p:nvPr/>
+        </p:nvSpPr>
+        <p:spPr>
+          <a:xfrm>
+            <a:off x="1240906" y="2816867"/>
+            <a:ext cx="854593" cy="148656"/>
+          </a:xfrm>
+          <a:prstGeom prst="roundRect">
+            <a:avLst/>
+          </a:prstGeom>
+          <a:solidFill>
+            <a:srgbClr val="ED7D31"/>
+          </a:solidFill>
+        </p:spPr>
+        <p:style>
+          <a:lnRef idx="2">
+            <a:schemeClr val="accent1">
+              <a:shade val="50000"/>
+            </a:schemeClr>
+          </a:lnRef>
+          <a:fillRef idx="1">
+            <a:schemeClr val="accent1"/>
+          </a:fillRef>
+          <a:effectRef idx="0">
+            <a:schemeClr val="accent1"/>
+          </a:effectRef>
+          <a:fontRef idx="minor">
+            <a:schemeClr val="lt1"/>
+          </a:fontRef>
+        </p:style>
+        <p:txBody>
+          <a:bodyPr rtlCol="0" anchor="ctr"/>
+          <a:lstStyle/>
+          <a:p>
+            <a:pPr algn="ctr"/>
+            <a:r>
+              <a:rPr lang="fr-FR" sz="900" dirty="0"/>
+              <a:t>PB_1</a:t>
+            </a:r>
+          </a:p>
+        </p:txBody>
+      </p:sp>
+      <p:sp>
+        <p:nvSpPr>
+          <p:cNvPr id="111" name="Rectangle : coins arrondis 110">
+            <a:extLst>
+              <a:ext uri="{FF2B5EF4-FFF2-40B4-BE49-F238E27FC236}">
+                <a16:creationId xmlns:a16="http://schemas.microsoft.com/office/drawing/2014/main" id="{BFFE0839-CBE0-A4F1-9F6B-51018C1B9FA0}"/>
+              </a:ext>
+            </a:extLst>
+          </p:cNvPr>
+          <p:cNvSpPr/>
+          <p:nvPr/>
+        </p:nvSpPr>
+        <p:spPr>
+          <a:xfrm>
+            <a:off x="1240908" y="2621469"/>
+            <a:ext cx="854593" cy="148656"/>
+          </a:xfrm>
+          <a:prstGeom prst="roundRect">
+            <a:avLst/>
+          </a:prstGeom>
+          <a:solidFill>
+            <a:srgbClr val="ED7D31"/>
+          </a:solidFill>
+        </p:spPr>
+        <p:style>
+          <a:lnRef idx="2">
+            <a:schemeClr val="accent1">
+              <a:shade val="50000"/>
+            </a:schemeClr>
+          </a:lnRef>
+          <a:fillRef idx="1">
+            <a:schemeClr val="accent1"/>
+          </a:fillRef>
+          <a:effectRef idx="0">
+            <a:schemeClr val="accent1"/>
+          </a:effectRef>
+          <a:fontRef idx="minor">
+            <a:schemeClr val="lt1"/>
+          </a:fontRef>
+        </p:style>
+        <p:txBody>
+          <a:bodyPr rtlCol="0" anchor="ctr"/>
+          <a:lstStyle/>
+          <a:p>
+            <a:pPr algn="ctr"/>
+            <a:r>
+              <a:rPr lang="fr-FR" sz="900" dirty="0"/>
+              <a:t>PB_2</a:t>
+            </a:r>
+          </a:p>
+        </p:txBody>
+      </p:sp>
+      <p:sp>
+        <p:nvSpPr>
+          <p:cNvPr id="112" name="Rectangle : coins arrondis 111">
+            <a:extLst>
+              <a:ext uri="{FF2B5EF4-FFF2-40B4-BE49-F238E27FC236}">
+                <a16:creationId xmlns:a16="http://schemas.microsoft.com/office/drawing/2014/main" id="{CC0FD9E2-A6CD-36F1-A8EC-EEE19E3197C7}"/>
+              </a:ext>
+            </a:extLst>
+          </p:cNvPr>
+          <p:cNvSpPr/>
+          <p:nvPr/>
+        </p:nvSpPr>
+        <p:spPr>
+          <a:xfrm>
+            <a:off x="1240904" y="4506411"/>
+            <a:ext cx="854593" cy="148656"/>
+          </a:xfrm>
+          <a:prstGeom prst="roundRect">
+            <a:avLst/>
+          </a:prstGeom>
+          <a:solidFill>
+            <a:srgbClr val="ED7D31"/>
+          </a:solidFill>
+        </p:spPr>
+        <p:style>
+          <a:lnRef idx="2">
+            <a:schemeClr val="accent1">
+              <a:shade val="50000"/>
+            </a:schemeClr>
+          </a:lnRef>
+          <a:fillRef idx="1">
+            <a:schemeClr val="accent1"/>
+          </a:fillRef>
+          <a:effectRef idx="0">
+            <a:schemeClr val="accent1"/>
+          </a:effectRef>
+          <a:fontRef idx="minor">
+            <a:schemeClr val="lt1"/>
+          </a:fontRef>
+        </p:style>
+        <p:txBody>
+          <a:bodyPr rtlCol="0" anchor="ctr"/>
+          <a:lstStyle/>
+          <a:p>
+            <a:pPr algn="ctr"/>
+            <a:r>
+              <a:rPr lang="fr-FR" sz="900" dirty="0"/>
+              <a:t>PB_10</a:t>
+            </a:r>
+          </a:p>
+        </p:txBody>
+      </p:sp>
+      <p:sp>
+        <p:nvSpPr>
+          <p:cNvPr id="113" name="Rectangle : coins arrondis 112">
+            <a:extLst>
+              <a:ext uri="{FF2B5EF4-FFF2-40B4-BE49-F238E27FC236}">
+                <a16:creationId xmlns:a16="http://schemas.microsoft.com/office/drawing/2014/main" id="{5C4CFB29-0229-ED8A-8B88-4235DB84EBA6}"/>
+              </a:ext>
+            </a:extLst>
+          </p:cNvPr>
+          <p:cNvSpPr/>
+          <p:nvPr/>
+        </p:nvSpPr>
+        <p:spPr>
+          <a:xfrm>
+            <a:off x="1240906" y="4311013"/>
+            <a:ext cx="854593" cy="148656"/>
+          </a:xfrm>
+          <a:prstGeom prst="roundRect">
+            <a:avLst/>
+          </a:prstGeom>
+          <a:solidFill>
+            <a:srgbClr val="ED7D31"/>
+          </a:solidFill>
+        </p:spPr>
+        <p:style>
+          <a:lnRef idx="2">
+            <a:schemeClr val="accent1">
+              <a:shade val="50000"/>
+            </a:schemeClr>
+          </a:lnRef>
+          <a:fillRef idx="1">
+            <a:schemeClr val="accent1"/>
+          </a:fillRef>
+          <a:effectRef idx="0">
+            <a:schemeClr val="accent1"/>
+          </a:effectRef>
+          <a:fontRef idx="minor">
+            <a:schemeClr val="lt1"/>
+          </a:fontRef>
+        </p:style>
+        <p:txBody>
+          <a:bodyPr rtlCol="0" anchor="ctr"/>
+          <a:lstStyle/>
+          <a:p>
+            <a:pPr algn="ctr"/>
+            <a:r>
+              <a:rPr lang="fr-FR" sz="900" dirty="0"/>
+              <a:t>PB_4</a:t>
+            </a:r>
+          </a:p>
+        </p:txBody>
+      </p:sp>
+      <p:sp>
+        <p:nvSpPr>
+          <p:cNvPr id="114" name="Rectangle : coins arrondis 113">
+            <a:extLst>
+              <a:ext uri="{FF2B5EF4-FFF2-40B4-BE49-F238E27FC236}">
+                <a16:creationId xmlns:a16="http://schemas.microsoft.com/office/drawing/2014/main" id="{154E5573-E369-76AA-49BF-DAF1E5B997B8}"/>
+              </a:ext>
+            </a:extLst>
+          </p:cNvPr>
+          <p:cNvSpPr/>
+          <p:nvPr/>
+        </p:nvSpPr>
+        <p:spPr>
+          <a:xfrm rot="5400000">
+            <a:off x="2529318" y="3290266"/>
+            <a:ext cx="562962" cy="569212"/>
+          </a:xfrm>
+          <a:prstGeom prst="roundRect">
+            <a:avLst/>
+          </a:prstGeom>
+          <a:solidFill>
+            <a:schemeClr val="bg1"/>
+          </a:solidFill>
+          <a:ln>
+            <a:solidFill>
+              <a:schemeClr val="tx1"/>
+            </a:solidFill>
+          </a:ln>
+        </p:spPr>
+        <p:style>
+          <a:lnRef idx="2">
+            <a:schemeClr val="accent1">
+              <a:shade val="50000"/>
+            </a:schemeClr>
+          </a:lnRef>
+          <a:fillRef idx="1">
+            <a:schemeClr val="accent1"/>
+          </a:fillRef>
+          <a:effectRef idx="0">
+            <a:schemeClr val="accent1"/>
+          </a:effectRef>
+          <a:fontRef idx="minor">
+            <a:schemeClr val="lt1"/>
+          </a:fontRef>
+        </p:style>
+        <p:txBody>
+          <a:bodyPr vert="vert270" rtlCol="0" anchor="ctr"/>
+          <a:lstStyle/>
+          <a:p>
+            <a:pPr algn="ctr"/>
+            <a:r>
+              <a:rPr lang="fr-FR" sz="1400" dirty="0">
+                <a:solidFill>
+                  <a:schemeClr val="tx1"/>
+                </a:solidFill>
+              </a:rPr>
+              <a:t>Pont H</a:t>
+            </a:r>
+          </a:p>
+        </p:txBody>
+      </p:sp>
+      <p:sp>
+        <p:nvSpPr>
+          <p:cNvPr id="115" name="Rectangle : coins arrondis 114">
+            <a:extLst>
+              <a:ext uri="{FF2B5EF4-FFF2-40B4-BE49-F238E27FC236}">
+                <a16:creationId xmlns:a16="http://schemas.microsoft.com/office/drawing/2014/main" id="{06273433-6BB7-6FB8-EE10-859B58AE53FB}"/>
+              </a:ext>
+            </a:extLst>
+          </p:cNvPr>
+          <p:cNvSpPr/>
+          <p:nvPr/>
+        </p:nvSpPr>
+        <p:spPr>
+          <a:xfrm>
+            <a:off x="2211864" y="1613594"/>
+            <a:ext cx="184619" cy="569212"/>
+          </a:xfrm>
+          <a:prstGeom prst="roundRect">
+            <a:avLst/>
+          </a:prstGeom>
+          <a:solidFill>
+            <a:schemeClr val="bg1"/>
+          </a:solidFill>
+          <a:ln>
+            <a:solidFill>
+              <a:schemeClr val="tx1"/>
+            </a:solidFill>
+          </a:ln>
+        </p:spPr>
+        <p:style>
+          <a:lnRef idx="2">
+            <a:schemeClr val="accent1">
+              <a:shade val="50000"/>
+            </a:schemeClr>
+          </a:lnRef>
+          <a:fillRef idx="1">
+            <a:schemeClr val="accent1"/>
+          </a:fillRef>
+          <a:effectRef idx="0">
+            <a:schemeClr val="accent1"/>
+          </a:effectRef>
+          <a:fontRef idx="minor">
+            <a:schemeClr val="lt1"/>
+          </a:fontRef>
+        </p:style>
+        <p:txBody>
+          <a:bodyPr vert="vert270" rtlCol="0" anchor="ctr"/>
+          <a:lstStyle/>
+          <a:p>
+            <a:pPr algn="ctr"/>
+            <a:r>
+              <a:rPr lang="fr-FR" sz="1400" dirty="0">
+                <a:solidFill>
+                  <a:schemeClr val="tx1"/>
+                </a:solidFill>
+              </a:rPr>
+              <a:t>PWM</a:t>
+            </a:r>
+          </a:p>
+        </p:txBody>
+      </p:sp>
+      <p:sp>
+        <p:nvSpPr>
+          <p:cNvPr id="116" name="Rectangle : coins arrondis 115">
+            <a:extLst>
+              <a:ext uri="{FF2B5EF4-FFF2-40B4-BE49-F238E27FC236}">
+                <a16:creationId xmlns:a16="http://schemas.microsoft.com/office/drawing/2014/main" id="{68162BFA-E6A7-05FC-3E6E-10EB883A8BC6}"/>
+              </a:ext>
+            </a:extLst>
+          </p:cNvPr>
+          <p:cNvSpPr/>
+          <p:nvPr/>
+        </p:nvSpPr>
+        <p:spPr>
+          <a:xfrm rot="5400000">
+            <a:off x="2500741" y="1607705"/>
+            <a:ext cx="562962" cy="569212"/>
+          </a:xfrm>
+          <a:prstGeom prst="roundRect">
+            <a:avLst/>
+          </a:prstGeom>
+          <a:solidFill>
+            <a:schemeClr val="bg1"/>
+          </a:solidFill>
+          <a:ln>
+            <a:solidFill>
+              <a:schemeClr val="tx1"/>
+            </a:solidFill>
+          </a:ln>
+        </p:spPr>
+        <p:style>
+          <a:lnRef idx="2">
+            <a:schemeClr val="accent1">
+              <a:shade val="50000"/>
+            </a:schemeClr>
+          </a:lnRef>
+          <a:fillRef idx="1">
+            <a:schemeClr val="accent1"/>
+          </a:fillRef>
+          <a:effectRef idx="0">
+            <a:schemeClr val="accent1"/>
+          </a:effectRef>
+          <a:fontRef idx="minor">
+            <a:schemeClr val="lt1"/>
+          </a:fontRef>
+        </p:style>
+        <p:txBody>
+          <a:bodyPr vert="vert270" rtlCol="0" anchor="ctr"/>
+          <a:lstStyle/>
+          <a:p>
+            <a:pPr algn="ctr"/>
+            <a:r>
+              <a:rPr lang="fr-FR" sz="1400" dirty="0">
+                <a:solidFill>
+                  <a:schemeClr val="tx1"/>
+                </a:solidFill>
+              </a:rPr>
+              <a:t>Pont H</a:t>
+            </a:r>
+          </a:p>
+        </p:txBody>
+      </p:sp>
+      <p:sp>
+        <p:nvSpPr>
+          <p:cNvPr id="117" name="Rectangle : coins arrondis 116">
+            <a:extLst>
+              <a:ext uri="{FF2B5EF4-FFF2-40B4-BE49-F238E27FC236}">
+                <a16:creationId xmlns:a16="http://schemas.microsoft.com/office/drawing/2014/main" id="{89F00D9C-7A80-FCFB-319A-0F551B59A17D}"/>
+              </a:ext>
+            </a:extLst>
+          </p:cNvPr>
+          <p:cNvSpPr/>
+          <p:nvPr/>
+        </p:nvSpPr>
+        <p:spPr>
+          <a:xfrm rot="5400000">
+            <a:off x="2448974" y="4076344"/>
+            <a:ext cx="386677" cy="772191"/>
+          </a:xfrm>
+          <a:prstGeom prst="roundRect">
+            <a:avLst/>
+          </a:prstGeom>
+          <a:solidFill>
+            <a:schemeClr val="bg1"/>
+          </a:solidFill>
+          <a:ln>
+            <a:solidFill>
+              <a:schemeClr val="tx1"/>
+            </a:solidFill>
+          </a:ln>
+        </p:spPr>
+        <p:style>
+          <a:lnRef idx="2">
+            <a:schemeClr val="accent1">
+              <a:shade val="50000"/>
+            </a:schemeClr>
+          </a:lnRef>
+          <a:fillRef idx="1">
+            <a:schemeClr val="accent1"/>
+          </a:fillRef>
+          <a:effectRef idx="0">
+            <a:schemeClr val="accent1"/>
+          </a:effectRef>
+          <a:fontRef idx="minor">
+            <a:schemeClr val="lt1"/>
+          </a:fontRef>
+        </p:style>
+        <p:txBody>
+          <a:bodyPr vert="vert270" rtlCol="0" anchor="ctr"/>
+          <a:lstStyle/>
+          <a:p>
+            <a:pPr algn="ctr"/>
+            <a:r>
+              <a:rPr lang="fr-FR" sz="1400" dirty="0">
+                <a:solidFill>
+                  <a:schemeClr val="tx1"/>
+                </a:solidFill>
+              </a:rPr>
+              <a:t>Codeur</a:t>
+            </a:r>
+          </a:p>
+        </p:txBody>
+      </p:sp>
+      <p:sp>
+        <p:nvSpPr>
+          <p:cNvPr id="118" name="Rectangle : coins arrondis 117">
+            <a:extLst>
+              <a:ext uri="{FF2B5EF4-FFF2-40B4-BE49-F238E27FC236}">
+                <a16:creationId xmlns:a16="http://schemas.microsoft.com/office/drawing/2014/main" id="{E6407692-FADE-C271-CCB6-F316916AE00E}"/>
+              </a:ext>
+            </a:extLst>
+          </p:cNvPr>
+          <p:cNvSpPr/>
+          <p:nvPr/>
+        </p:nvSpPr>
+        <p:spPr>
+          <a:xfrm rot="5400000">
+            <a:off x="2433198" y="2389890"/>
+            <a:ext cx="386677" cy="772191"/>
+          </a:xfrm>
+          <a:prstGeom prst="roundRect">
+            <a:avLst/>
+          </a:prstGeom>
+          <a:solidFill>
+            <a:schemeClr val="bg1"/>
+          </a:solidFill>
+          <a:ln>
+            <a:solidFill>
+              <a:schemeClr val="tx1"/>
+            </a:solidFill>
+          </a:ln>
+        </p:spPr>
+        <p:style>
+          <a:lnRef idx="2">
+            <a:schemeClr val="accent1">
+              <a:shade val="50000"/>
+            </a:schemeClr>
+          </a:lnRef>
+          <a:fillRef idx="1">
+            <a:schemeClr val="accent1"/>
+          </a:fillRef>
+          <a:effectRef idx="0">
+            <a:schemeClr val="accent1"/>
+          </a:effectRef>
+          <a:fontRef idx="minor">
+            <a:schemeClr val="lt1"/>
+          </a:fontRef>
+        </p:style>
+        <p:txBody>
+          <a:bodyPr vert="vert270" rtlCol="0" anchor="ctr"/>
+          <a:lstStyle/>
+          <a:p>
+            <a:pPr algn="ctr"/>
+            <a:r>
+              <a:rPr lang="fr-FR" sz="1400" dirty="0">
+                <a:solidFill>
+                  <a:schemeClr val="tx1"/>
+                </a:solidFill>
+              </a:rPr>
+              <a:t>Codeur</a:t>
+            </a:r>
+          </a:p>
+        </p:txBody>
+      </p:sp>
+      <p:sp>
+        <p:nvSpPr>
+          <p:cNvPr id="119" name="Rectangle : coins arrondis 118">
+            <a:extLst>
+              <a:ext uri="{FF2B5EF4-FFF2-40B4-BE49-F238E27FC236}">
+                <a16:creationId xmlns:a16="http://schemas.microsoft.com/office/drawing/2014/main" id="{9A8ACECF-5D0C-CF52-7355-BBA2BEEFBD37}"/>
+              </a:ext>
+            </a:extLst>
+          </p:cNvPr>
+          <p:cNvSpPr/>
+          <p:nvPr/>
+        </p:nvSpPr>
+        <p:spPr>
+          <a:xfrm>
+            <a:off x="6771758" y="1603458"/>
+            <a:ext cx="922585" cy="3825966"/>
+          </a:xfrm>
+          <a:prstGeom prst="roundRect">
+            <a:avLst/>
+          </a:prstGeom>
+          <a:solidFill>
+            <a:schemeClr val="bg2"/>
+          </a:solidFill>
+        </p:spPr>
+        <p:style>
+          <a:lnRef idx="2">
+            <a:schemeClr val="accent1">
+              <a:shade val="50000"/>
+            </a:schemeClr>
+          </a:lnRef>
+          <a:fillRef idx="1">
+            <a:schemeClr val="accent1"/>
+          </a:fillRef>
+          <a:effectRef idx="0">
+            <a:schemeClr val="accent1"/>
+          </a:effectRef>
+          <a:fontRef idx="minor">
+            <a:schemeClr val="lt1"/>
+          </a:fontRef>
+        </p:style>
+        <p:txBody>
+          <a:bodyPr vert="vert270" rtlCol="0" anchor="ctr"/>
+          <a:lstStyle/>
+          <a:p>
+            <a:pPr algn="ctr"/>
+            <a:r>
+              <a:rPr lang="fr-FR" sz="2400" dirty="0" err="1">
+                <a:solidFill>
+                  <a:schemeClr val="bg1">
+                    <a:lumMod val="50000"/>
+                  </a:schemeClr>
+                </a:solidFill>
+              </a:rPr>
+              <a:t>Nucleo</a:t>
+            </a:r>
+            <a:r>
+              <a:rPr lang="fr-FR" sz="2400" dirty="0">
+                <a:solidFill>
+                  <a:schemeClr val="bg1">
+                    <a:lumMod val="50000"/>
+                  </a:schemeClr>
+                </a:solidFill>
+              </a:rPr>
+              <a:t> </a:t>
+            </a:r>
+            <a:r>
+              <a:rPr lang="fr-FR" sz="2400" dirty="0" err="1">
+                <a:solidFill>
+                  <a:schemeClr val="bg1">
+                    <a:lumMod val="50000"/>
+                  </a:schemeClr>
+                </a:solidFill>
+              </a:rPr>
+              <a:t>Board</a:t>
+            </a:r>
+            <a:endParaRPr lang="fr-FR" sz="2400" dirty="0">
+              <a:solidFill>
+                <a:schemeClr val="bg1">
+                  <a:lumMod val="50000"/>
+                </a:schemeClr>
+              </a:solidFill>
+            </a:endParaRPr>
+          </a:p>
+        </p:txBody>
+      </p:sp>
+      <p:sp>
+        <p:nvSpPr>
+          <p:cNvPr id="120" name="Rectangle : coins arrondis 119">
+            <a:extLst>
+              <a:ext uri="{FF2B5EF4-FFF2-40B4-BE49-F238E27FC236}">
+                <a16:creationId xmlns:a16="http://schemas.microsoft.com/office/drawing/2014/main" id="{CC4AC2A2-5692-D2B5-E97D-9F73B1C86311}"/>
+              </a:ext>
+            </a:extLst>
+          </p:cNvPr>
+          <p:cNvSpPr/>
+          <p:nvPr/>
+        </p:nvSpPr>
+        <p:spPr>
+          <a:xfrm>
+            <a:off x="10154252" y="1654174"/>
+            <a:ext cx="772357" cy="1412698"/>
+          </a:xfrm>
+          <a:prstGeom prst="roundRect">
+            <a:avLst/>
+          </a:prstGeom>
+          <a:solidFill>
+            <a:schemeClr val="accent5">
+              <a:lumMod val="20000"/>
+              <a:lumOff val="80000"/>
+            </a:schemeClr>
+          </a:solidFill>
+        </p:spPr>
+        <p:style>
+          <a:lnRef idx="2">
+            <a:schemeClr val="accent1">
+              <a:shade val="50000"/>
+            </a:schemeClr>
+          </a:lnRef>
+          <a:fillRef idx="1">
+            <a:schemeClr val="accent1"/>
+          </a:fillRef>
+          <a:effectRef idx="0">
+            <a:schemeClr val="accent1"/>
+          </a:effectRef>
+          <a:fontRef idx="minor">
+            <a:schemeClr val="lt1"/>
+          </a:fontRef>
+        </p:style>
+        <p:txBody>
+          <a:bodyPr vert="vert270" rtlCol="0" anchor="ctr"/>
+          <a:lstStyle/>
+          <a:p>
+            <a:pPr algn="ctr"/>
+            <a:r>
+              <a:rPr lang="fr-FR" dirty="0">
+                <a:solidFill>
+                  <a:schemeClr val="bg1">
+                    <a:lumMod val="50000"/>
+                  </a:schemeClr>
+                </a:solidFill>
+              </a:rPr>
+              <a:t>Moteur 1</a:t>
+            </a:r>
+          </a:p>
+        </p:txBody>
+      </p:sp>
+      <p:sp>
+        <p:nvSpPr>
+          <p:cNvPr id="122" name="Rectangle : coins arrondis 121">
+            <a:extLst>
+              <a:ext uri="{FF2B5EF4-FFF2-40B4-BE49-F238E27FC236}">
+                <a16:creationId xmlns:a16="http://schemas.microsoft.com/office/drawing/2014/main" id="{36A7009A-4D13-6628-2BC3-B3C03AD40D24}"/>
+              </a:ext>
+            </a:extLst>
+          </p:cNvPr>
+          <p:cNvSpPr/>
+          <p:nvPr/>
+        </p:nvSpPr>
+        <p:spPr>
+          <a:xfrm>
+            <a:off x="9503690" y="2834236"/>
+            <a:ext cx="772357" cy="148656"/>
+          </a:xfrm>
+          <a:prstGeom prst="roundRect">
+            <a:avLst/>
+          </a:prstGeom>
+          <a:solidFill>
+            <a:srgbClr val="4472C4"/>
+          </a:solidFill>
+        </p:spPr>
+        <p:style>
+          <a:lnRef idx="2">
+            <a:schemeClr val="accent1">
+              <a:shade val="50000"/>
+            </a:schemeClr>
+          </a:lnRef>
+          <a:fillRef idx="1">
+            <a:schemeClr val="accent1"/>
+          </a:fillRef>
+          <a:effectRef idx="0">
+            <a:schemeClr val="accent1"/>
+          </a:effectRef>
+          <a:fontRef idx="minor">
+            <a:schemeClr val="lt1"/>
+          </a:fontRef>
+        </p:style>
+        <p:txBody>
+          <a:bodyPr rtlCol="0" anchor="ctr"/>
+          <a:lstStyle/>
+          <a:p>
+            <a:pPr algn="ctr"/>
+            <a:r>
+              <a:rPr lang="fr-FR" sz="1100" dirty="0"/>
+              <a:t>M1_B</a:t>
+            </a:r>
+          </a:p>
+        </p:txBody>
+      </p:sp>
+      <p:sp>
+        <p:nvSpPr>
+          <p:cNvPr id="123" name="Rectangle : coins arrondis 122">
+            <a:extLst>
+              <a:ext uri="{FF2B5EF4-FFF2-40B4-BE49-F238E27FC236}">
+                <a16:creationId xmlns:a16="http://schemas.microsoft.com/office/drawing/2014/main" id="{DA1DC688-AFEF-E932-3EFC-989005C5CDA5}"/>
+              </a:ext>
+            </a:extLst>
+          </p:cNvPr>
+          <p:cNvSpPr/>
+          <p:nvPr/>
+        </p:nvSpPr>
+        <p:spPr>
+          <a:xfrm>
+            <a:off x="9503689" y="2645862"/>
+            <a:ext cx="772357" cy="148656"/>
+          </a:xfrm>
+          <a:prstGeom prst="roundRect">
+            <a:avLst/>
+          </a:prstGeom>
+          <a:solidFill>
+            <a:schemeClr val="accent1"/>
+          </a:solidFill>
+        </p:spPr>
+        <p:style>
+          <a:lnRef idx="2">
+            <a:schemeClr val="accent1">
+              <a:shade val="50000"/>
+            </a:schemeClr>
+          </a:lnRef>
+          <a:fillRef idx="1">
+            <a:schemeClr val="accent1"/>
+          </a:fillRef>
+          <a:effectRef idx="0">
+            <a:schemeClr val="accent1"/>
+          </a:effectRef>
+          <a:fontRef idx="minor">
+            <a:schemeClr val="lt1"/>
+          </a:fontRef>
+        </p:style>
+        <p:txBody>
+          <a:bodyPr rtlCol="0" anchor="ctr"/>
+          <a:lstStyle/>
+          <a:p>
+            <a:pPr algn="ctr"/>
+            <a:r>
+              <a:rPr lang="fr-FR" sz="1100" dirty="0"/>
+              <a:t>M1_A</a:t>
+            </a:r>
+          </a:p>
+        </p:txBody>
+      </p:sp>
+      <p:sp>
+        <p:nvSpPr>
+          <p:cNvPr id="124" name="Rectangle : coins arrondis 123">
+            <a:extLst>
+              <a:ext uri="{FF2B5EF4-FFF2-40B4-BE49-F238E27FC236}">
+                <a16:creationId xmlns:a16="http://schemas.microsoft.com/office/drawing/2014/main" id="{FF86AAA6-C912-7CBD-07D6-FE82E2845A51}"/>
+              </a:ext>
+            </a:extLst>
+          </p:cNvPr>
+          <p:cNvSpPr/>
+          <p:nvPr/>
+        </p:nvSpPr>
+        <p:spPr>
+          <a:xfrm>
+            <a:off x="9503689" y="2185902"/>
+            <a:ext cx="772357" cy="148656"/>
+          </a:xfrm>
+          <a:prstGeom prst="roundRect">
+            <a:avLst/>
+          </a:prstGeom>
+          <a:solidFill>
+            <a:schemeClr val="tx1"/>
+          </a:solidFill>
+        </p:spPr>
+        <p:style>
+          <a:lnRef idx="2">
+            <a:schemeClr val="accent1">
+              <a:shade val="50000"/>
+            </a:schemeClr>
+          </a:lnRef>
+          <a:fillRef idx="1">
+            <a:schemeClr val="accent1"/>
+          </a:fillRef>
+          <a:effectRef idx="0">
+            <a:schemeClr val="accent1"/>
+          </a:effectRef>
+          <a:fontRef idx="minor">
+            <a:schemeClr val="lt1"/>
+          </a:fontRef>
+        </p:style>
+        <p:txBody>
+          <a:bodyPr rtlCol="0" anchor="ctr"/>
+          <a:lstStyle/>
+          <a:p>
+            <a:pPr algn="ctr"/>
+            <a:r>
+              <a:rPr lang="fr-FR" sz="1100" dirty="0"/>
+              <a:t>GND</a:t>
+            </a:r>
+          </a:p>
+        </p:txBody>
+      </p:sp>
+      <p:sp>
+        <p:nvSpPr>
+          <p:cNvPr id="125" name="Rectangle : coins arrondis 124">
+            <a:extLst>
+              <a:ext uri="{FF2B5EF4-FFF2-40B4-BE49-F238E27FC236}">
+                <a16:creationId xmlns:a16="http://schemas.microsoft.com/office/drawing/2014/main" id="{0CAF8CBF-0570-BEBF-68AD-EE291CE33A6E}"/>
+              </a:ext>
+            </a:extLst>
+          </p:cNvPr>
+          <p:cNvSpPr/>
+          <p:nvPr/>
+        </p:nvSpPr>
+        <p:spPr>
+          <a:xfrm>
+            <a:off x="9503688" y="2370761"/>
+            <a:ext cx="772357" cy="148656"/>
+          </a:xfrm>
+          <a:prstGeom prst="roundRect">
+            <a:avLst/>
+          </a:prstGeom>
+          <a:solidFill>
+            <a:srgbClr val="FF0000"/>
+          </a:solidFill>
+        </p:spPr>
+        <p:style>
+          <a:lnRef idx="2">
+            <a:schemeClr val="accent1">
+              <a:shade val="50000"/>
+            </a:schemeClr>
+          </a:lnRef>
+          <a:fillRef idx="1">
+            <a:schemeClr val="accent1"/>
+          </a:fillRef>
+          <a:effectRef idx="0">
+            <a:schemeClr val="accent1"/>
+          </a:effectRef>
+          <a:fontRef idx="minor">
+            <a:schemeClr val="lt1"/>
+          </a:fontRef>
+        </p:style>
+        <p:txBody>
+          <a:bodyPr rtlCol="0" anchor="ctr"/>
+          <a:lstStyle/>
+          <a:p>
+            <a:pPr algn="ctr"/>
+            <a:r>
+              <a:rPr lang="fr-FR" sz="1100" dirty="0"/>
+              <a:t>3.3V</a:t>
+            </a:r>
+          </a:p>
+        </p:txBody>
+      </p:sp>
+      <p:sp>
+        <p:nvSpPr>
+          <p:cNvPr id="126" name="Rectangle : coins arrondis 125">
+            <a:extLst>
+              <a:ext uri="{FF2B5EF4-FFF2-40B4-BE49-F238E27FC236}">
+                <a16:creationId xmlns:a16="http://schemas.microsoft.com/office/drawing/2014/main" id="{7BD194FE-6A9B-0053-DE69-87EE898145FE}"/>
+              </a:ext>
+            </a:extLst>
+          </p:cNvPr>
+          <p:cNvSpPr/>
+          <p:nvPr/>
+        </p:nvSpPr>
+        <p:spPr>
+          <a:xfrm>
+            <a:off x="9503688" y="1903623"/>
+            <a:ext cx="772357" cy="148656"/>
+          </a:xfrm>
+          <a:prstGeom prst="roundRect">
+            <a:avLst/>
+          </a:prstGeom>
+          <a:solidFill>
+            <a:srgbClr val="7F7F7F"/>
+          </a:solidFill>
+        </p:spPr>
+        <p:style>
+          <a:lnRef idx="2">
+            <a:schemeClr val="accent1">
+              <a:shade val="50000"/>
+            </a:schemeClr>
+          </a:lnRef>
+          <a:fillRef idx="1">
+            <a:schemeClr val="accent1"/>
+          </a:fillRef>
+          <a:effectRef idx="0">
+            <a:schemeClr val="accent1"/>
+          </a:effectRef>
+          <a:fontRef idx="minor">
+            <a:schemeClr val="lt1"/>
+          </a:fontRef>
+        </p:style>
+        <p:txBody>
+          <a:bodyPr rtlCol="0" anchor="ctr"/>
+          <a:lstStyle/>
+          <a:p>
+            <a:pPr algn="ctr"/>
+            <a:r>
+              <a:rPr lang="fr-FR" sz="1100" dirty="0"/>
+              <a:t>M1 -</a:t>
+            </a:r>
+          </a:p>
+        </p:txBody>
+      </p:sp>
+      <p:sp>
+        <p:nvSpPr>
+          <p:cNvPr id="127" name="Rectangle : coins arrondis 126">
+            <a:extLst>
+              <a:ext uri="{FF2B5EF4-FFF2-40B4-BE49-F238E27FC236}">
+                <a16:creationId xmlns:a16="http://schemas.microsoft.com/office/drawing/2014/main" id="{DFC9A424-E8BF-BBE6-DFF0-36E222FD4988}"/>
+              </a:ext>
+            </a:extLst>
+          </p:cNvPr>
+          <p:cNvSpPr/>
+          <p:nvPr/>
+        </p:nvSpPr>
+        <p:spPr>
+          <a:xfrm>
+            <a:off x="9503687" y="1715249"/>
+            <a:ext cx="772357" cy="148656"/>
+          </a:xfrm>
+          <a:prstGeom prst="roundRect">
+            <a:avLst/>
+          </a:prstGeom>
+          <a:solidFill>
+            <a:srgbClr val="7F7F7F"/>
+          </a:solidFill>
+        </p:spPr>
+        <p:style>
+          <a:lnRef idx="2">
+            <a:schemeClr val="accent1">
+              <a:shade val="50000"/>
+            </a:schemeClr>
+          </a:lnRef>
+          <a:fillRef idx="1">
+            <a:schemeClr val="accent1"/>
+          </a:fillRef>
+          <a:effectRef idx="0">
+            <a:schemeClr val="accent1"/>
+          </a:effectRef>
+          <a:fontRef idx="minor">
+            <a:schemeClr val="lt1"/>
+          </a:fontRef>
+        </p:style>
+        <p:txBody>
+          <a:bodyPr rtlCol="0" anchor="ctr"/>
+          <a:lstStyle/>
+          <a:p>
+            <a:pPr algn="ctr"/>
+            <a:r>
+              <a:rPr lang="fr-FR" sz="1100" dirty="0"/>
+              <a:t>M1 +</a:t>
+            </a:r>
+          </a:p>
+        </p:txBody>
+      </p:sp>
+      <p:sp>
+        <p:nvSpPr>
+          <p:cNvPr id="135" name="Rectangle : coins arrondis 134">
+            <a:extLst>
+              <a:ext uri="{FF2B5EF4-FFF2-40B4-BE49-F238E27FC236}">
+                <a16:creationId xmlns:a16="http://schemas.microsoft.com/office/drawing/2014/main" id="{D1D23FA6-F3A6-577F-5414-F6D41F01C012}"/>
+              </a:ext>
+            </a:extLst>
+          </p:cNvPr>
+          <p:cNvSpPr/>
+          <p:nvPr/>
+        </p:nvSpPr>
+        <p:spPr>
+          <a:xfrm>
+            <a:off x="7584039" y="1892310"/>
+            <a:ext cx="854593" cy="148656"/>
+          </a:xfrm>
+          <a:prstGeom prst="roundRect">
+            <a:avLst/>
+          </a:prstGeom>
+        </p:spPr>
+        <p:style>
+          <a:lnRef idx="2">
+            <a:schemeClr val="accent1">
+              <a:shade val="50000"/>
+            </a:schemeClr>
+          </a:lnRef>
+          <a:fillRef idx="1">
+            <a:schemeClr val="accent1"/>
+          </a:fillRef>
+          <a:effectRef idx="0">
+            <a:schemeClr val="accent1"/>
+          </a:effectRef>
+          <a:fontRef idx="minor">
+            <a:schemeClr val="lt1"/>
+          </a:fontRef>
+        </p:style>
+        <p:txBody>
+          <a:bodyPr rtlCol="0" anchor="ctr"/>
+          <a:lstStyle/>
+          <a:p>
+            <a:pPr algn="ctr"/>
+            <a:r>
+              <a:rPr lang="fr-FR" sz="900" dirty="0"/>
+              <a:t>PA_10</a:t>
+            </a:r>
+          </a:p>
+        </p:txBody>
+      </p:sp>
+      <p:sp>
+        <p:nvSpPr>
+          <p:cNvPr id="136" name="Rectangle : coins arrondis 135">
+            <a:extLst>
+              <a:ext uri="{FF2B5EF4-FFF2-40B4-BE49-F238E27FC236}">
+                <a16:creationId xmlns:a16="http://schemas.microsoft.com/office/drawing/2014/main" id="{A0C094F0-DA6B-1EE6-1192-CF9B899ED4EA}"/>
+              </a:ext>
+            </a:extLst>
+          </p:cNvPr>
+          <p:cNvSpPr/>
+          <p:nvPr/>
+        </p:nvSpPr>
+        <p:spPr>
+          <a:xfrm>
+            <a:off x="7584041" y="1696912"/>
+            <a:ext cx="854593" cy="148656"/>
+          </a:xfrm>
+          <a:prstGeom prst="roundRect">
+            <a:avLst/>
+          </a:prstGeom>
+        </p:spPr>
+        <p:style>
+          <a:lnRef idx="2">
+            <a:schemeClr val="accent1">
+              <a:shade val="50000"/>
+            </a:schemeClr>
+          </a:lnRef>
+          <a:fillRef idx="1">
+            <a:schemeClr val="accent1"/>
+          </a:fillRef>
+          <a:effectRef idx="0">
+            <a:schemeClr val="accent1"/>
+          </a:effectRef>
+          <a:fontRef idx="minor">
+            <a:schemeClr val="lt1"/>
+          </a:fontRef>
+        </p:style>
+        <p:txBody>
+          <a:bodyPr rtlCol="0" anchor="ctr"/>
+          <a:lstStyle/>
+          <a:p>
+            <a:pPr algn="ctr"/>
+            <a:r>
+              <a:rPr lang="fr-FR" sz="900" dirty="0"/>
+              <a:t>PB_14</a:t>
+            </a:r>
+          </a:p>
+        </p:txBody>
+      </p:sp>
+      <p:sp>
+        <p:nvSpPr>
+          <p:cNvPr id="139" name="Rectangle : coins arrondis 138">
+            <a:extLst>
+              <a:ext uri="{FF2B5EF4-FFF2-40B4-BE49-F238E27FC236}">
+                <a16:creationId xmlns:a16="http://schemas.microsoft.com/office/drawing/2014/main" id="{78B4134C-2374-CB65-4546-F824D2C9BCCC}"/>
+              </a:ext>
+            </a:extLst>
+          </p:cNvPr>
+          <p:cNvSpPr/>
+          <p:nvPr/>
+        </p:nvSpPr>
+        <p:spPr>
+          <a:xfrm>
+            <a:off x="7584039" y="2816866"/>
+            <a:ext cx="854593" cy="148656"/>
+          </a:xfrm>
+          <a:prstGeom prst="roundRect">
+            <a:avLst/>
+          </a:prstGeom>
+          <a:solidFill>
+            <a:schemeClr val="bg1">
+              <a:lumMod val="50000"/>
+            </a:schemeClr>
+          </a:solidFill>
+        </p:spPr>
+        <p:style>
+          <a:lnRef idx="2">
+            <a:schemeClr val="accent1">
+              <a:shade val="50000"/>
+            </a:schemeClr>
+          </a:lnRef>
+          <a:fillRef idx="1">
+            <a:schemeClr val="accent1"/>
+          </a:fillRef>
+          <a:effectRef idx="0">
+            <a:schemeClr val="accent1"/>
+          </a:effectRef>
+          <a:fontRef idx="minor">
+            <a:schemeClr val="lt1"/>
+          </a:fontRef>
+        </p:style>
+        <p:txBody>
+          <a:bodyPr rtlCol="0" anchor="ctr"/>
+          <a:lstStyle/>
+          <a:p>
+            <a:pPr algn="ctr"/>
+            <a:r>
+              <a:rPr lang="fr-FR" sz="900" dirty="0"/>
+              <a:t>NOT CON.</a:t>
+            </a:r>
+          </a:p>
+        </p:txBody>
+      </p:sp>
+      <p:sp>
+        <p:nvSpPr>
+          <p:cNvPr id="140" name="Rectangle : coins arrondis 139">
+            <a:extLst>
+              <a:ext uri="{FF2B5EF4-FFF2-40B4-BE49-F238E27FC236}">
+                <a16:creationId xmlns:a16="http://schemas.microsoft.com/office/drawing/2014/main" id="{51F26F56-AD5A-0DD8-A5EB-7E1AEF6894F8}"/>
+              </a:ext>
+            </a:extLst>
+          </p:cNvPr>
+          <p:cNvSpPr/>
+          <p:nvPr/>
+        </p:nvSpPr>
+        <p:spPr>
+          <a:xfrm>
+            <a:off x="7584041" y="2621468"/>
+            <a:ext cx="854593" cy="148656"/>
+          </a:xfrm>
+          <a:prstGeom prst="roundRect">
+            <a:avLst/>
+          </a:prstGeom>
+          <a:solidFill>
+            <a:srgbClr val="ED7D31"/>
+          </a:solidFill>
+        </p:spPr>
+        <p:style>
+          <a:lnRef idx="2">
+            <a:schemeClr val="accent1">
+              <a:shade val="50000"/>
+            </a:schemeClr>
+          </a:lnRef>
+          <a:fillRef idx="1">
+            <a:schemeClr val="accent1"/>
+          </a:fillRef>
+          <a:effectRef idx="0">
+            <a:schemeClr val="accent1"/>
+          </a:effectRef>
+          <a:fontRef idx="minor">
+            <a:schemeClr val="lt1"/>
+          </a:fontRef>
+        </p:style>
+        <p:txBody>
+          <a:bodyPr rtlCol="0" anchor="ctr"/>
+          <a:lstStyle/>
+          <a:p>
+            <a:pPr algn="ctr"/>
+            <a:r>
+              <a:rPr lang="fr-FR" sz="900" dirty="0"/>
+              <a:t>PB_0</a:t>
+            </a:r>
+          </a:p>
+        </p:txBody>
+      </p:sp>
+      <p:sp>
+        <p:nvSpPr>
+          <p:cNvPr id="144" name="Rectangle : coins arrondis 143">
+            <a:extLst>
+              <a:ext uri="{FF2B5EF4-FFF2-40B4-BE49-F238E27FC236}">
+                <a16:creationId xmlns:a16="http://schemas.microsoft.com/office/drawing/2014/main" id="{93188835-FED5-9386-F11A-AF154D934C69}"/>
+              </a:ext>
+            </a:extLst>
+          </p:cNvPr>
+          <p:cNvSpPr/>
+          <p:nvPr/>
+        </p:nvSpPr>
+        <p:spPr>
+          <a:xfrm>
+            <a:off x="8554997" y="1613593"/>
+            <a:ext cx="184619" cy="569212"/>
+          </a:xfrm>
+          <a:prstGeom prst="roundRect">
+            <a:avLst/>
+          </a:prstGeom>
+          <a:solidFill>
+            <a:schemeClr val="bg1"/>
+          </a:solidFill>
+          <a:ln>
+            <a:solidFill>
+              <a:schemeClr val="tx1"/>
+            </a:solidFill>
+          </a:ln>
+        </p:spPr>
+        <p:style>
+          <a:lnRef idx="2">
+            <a:schemeClr val="accent1">
+              <a:shade val="50000"/>
+            </a:schemeClr>
+          </a:lnRef>
+          <a:fillRef idx="1">
+            <a:schemeClr val="accent1"/>
+          </a:fillRef>
+          <a:effectRef idx="0">
+            <a:schemeClr val="accent1"/>
+          </a:effectRef>
+          <a:fontRef idx="minor">
+            <a:schemeClr val="lt1"/>
+          </a:fontRef>
+        </p:style>
+        <p:txBody>
+          <a:bodyPr vert="vert270" rtlCol="0" anchor="ctr"/>
+          <a:lstStyle/>
+          <a:p>
+            <a:pPr algn="ctr"/>
+            <a:r>
+              <a:rPr lang="fr-FR" sz="1400" dirty="0">
+                <a:solidFill>
+                  <a:schemeClr val="tx1"/>
+                </a:solidFill>
+              </a:rPr>
+              <a:t>PWM</a:t>
+            </a:r>
+          </a:p>
+        </p:txBody>
+      </p:sp>
+      <p:sp>
+        <p:nvSpPr>
+          <p:cNvPr id="145" name="Rectangle : coins arrondis 144">
+            <a:extLst>
+              <a:ext uri="{FF2B5EF4-FFF2-40B4-BE49-F238E27FC236}">
+                <a16:creationId xmlns:a16="http://schemas.microsoft.com/office/drawing/2014/main" id="{8DFE9345-FEB0-F53C-4A31-14C78E4A459C}"/>
+              </a:ext>
+            </a:extLst>
+          </p:cNvPr>
+          <p:cNvSpPr/>
+          <p:nvPr/>
+        </p:nvSpPr>
+        <p:spPr>
+          <a:xfrm rot="5400000">
+            <a:off x="8843874" y="1607704"/>
+            <a:ext cx="562962" cy="569212"/>
+          </a:xfrm>
+          <a:prstGeom prst="roundRect">
+            <a:avLst/>
+          </a:prstGeom>
+          <a:solidFill>
+            <a:schemeClr val="bg1"/>
+          </a:solidFill>
+          <a:ln>
+            <a:solidFill>
+              <a:schemeClr val="tx1"/>
+            </a:solidFill>
+          </a:ln>
+        </p:spPr>
+        <p:style>
+          <a:lnRef idx="2">
+            <a:schemeClr val="accent1">
+              <a:shade val="50000"/>
+            </a:schemeClr>
+          </a:lnRef>
+          <a:fillRef idx="1">
+            <a:schemeClr val="accent1"/>
+          </a:fillRef>
+          <a:effectRef idx="0">
+            <a:schemeClr val="accent1"/>
+          </a:effectRef>
+          <a:fontRef idx="minor">
+            <a:schemeClr val="lt1"/>
+          </a:fontRef>
+        </p:style>
+        <p:txBody>
+          <a:bodyPr vert="vert270" rtlCol="0" anchor="ctr"/>
+          <a:lstStyle/>
+          <a:p>
+            <a:pPr algn="ctr"/>
+            <a:r>
+              <a:rPr lang="fr-FR" sz="1400" dirty="0">
+                <a:solidFill>
+                  <a:schemeClr val="tx1"/>
+                </a:solidFill>
+              </a:rPr>
+              <a:t>Pont H</a:t>
+            </a:r>
+          </a:p>
+        </p:txBody>
+      </p:sp>
+      <p:sp>
+        <p:nvSpPr>
+          <p:cNvPr id="147" name="Rectangle : coins arrondis 146">
+            <a:extLst>
+              <a:ext uri="{FF2B5EF4-FFF2-40B4-BE49-F238E27FC236}">
+                <a16:creationId xmlns:a16="http://schemas.microsoft.com/office/drawing/2014/main" id="{B5E51970-2209-6D41-918C-810C79D80996}"/>
+              </a:ext>
+            </a:extLst>
+          </p:cNvPr>
+          <p:cNvSpPr/>
+          <p:nvPr/>
+        </p:nvSpPr>
+        <p:spPr>
+          <a:xfrm rot="5400000">
+            <a:off x="8776331" y="2389889"/>
+            <a:ext cx="386677" cy="772191"/>
+          </a:xfrm>
+          <a:prstGeom prst="roundRect">
+            <a:avLst/>
+          </a:prstGeom>
+          <a:solidFill>
+            <a:schemeClr val="bg1"/>
+          </a:solidFill>
+          <a:ln>
+            <a:solidFill>
+              <a:schemeClr val="tx1"/>
+            </a:solidFill>
+          </a:ln>
+        </p:spPr>
+        <p:style>
+          <a:lnRef idx="2">
+            <a:schemeClr val="accent1">
+              <a:shade val="50000"/>
+            </a:schemeClr>
+          </a:lnRef>
+          <a:fillRef idx="1">
+            <a:schemeClr val="accent1"/>
+          </a:fillRef>
+          <a:effectRef idx="0">
+            <a:schemeClr val="accent1"/>
+          </a:effectRef>
+          <a:fontRef idx="minor">
+            <a:schemeClr val="lt1"/>
+          </a:fontRef>
+        </p:style>
+        <p:txBody>
+          <a:bodyPr vert="vert270" rtlCol="0" anchor="ctr"/>
+          <a:lstStyle/>
+          <a:p>
+            <a:pPr algn="ctr"/>
+            <a:r>
+              <a:rPr lang="fr-FR" sz="1400" dirty="0">
+                <a:solidFill>
+                  <a:schemeClr val="tx1"/>
+                </a:solidFill>
+              </a:rPr>
+              <a:t>Codeur</a:t>
+            </a:r>
+          </a:p>
+        </p:txBody>
+      </p:sp>
+      <p:pic>
+        <p:nvPicPr>
+          <p:cNvPr id="149" name="Image 148">
+            <a:extLst>
+              <a:ext uri="{FF2B5EF4-FFF2-40B4-BE49-F238E27FC236}">
+                <a16:creationId xmlns:a16="http://schemas.microsoft.com/office/drawing/2014/main" id="{EBA18948-9D74-19A1-051E-E530BE2544A6}"/>
+              </a:ext>
+            </a:extLst>
+          </p:cNvPr>
+          <p:cNvPicPr>
+            <a:picLocks noChangeAspect="1"/>
+          </p:cNvPicPr>
+          <p:nvPr/>
+        </p:nvPicPr>
+        <p:blipFill>
+          <a:blip r:embed="rId2"/>
+          <a:stretch>
+            <a:fillRect/>
+          </a:stretch>
+        </p:blipFill>
+        <p:spPr>
+          <a:xfrm>
+            <a:off x="7883840" y="3369164"/>
+            <a:ext cx="3909191" cy="3416886"/>
+          </a:xfrm>
+          <a:prstGeom prst="rect">
+            <a:avLst/>
+          </a:prstGeom>
+        </p:spPr>
+      </p:pic>
+    </p:spTree>
+    <p:extLst>
+      <p:ext uri="{BB962C8B-B14F-4D97-AF65-F5344CB8AC3E}">
+        <p14:creationId xmlns:p14="http://schemas.microsoft.com/office/powerpoint/2010/main" val="4073391767"/>
+      </p:ext>
+    </p:extLst>
+  </p:cSld>
+  <p:clrMapOvr>
+    <a:masterClrMapping/>
+  </p:clrMapOvr>
+</p:sld>
+</file>
+
+<file path=ppt/slides/slide5.xml><?xml version="1.0" encoding="utf-8"?>
+<p:sld xmlns:a="http://schemas.openxmlformats.org/drawingml/2006/main" xmlns:r="http://schemas.openxmlformats.org/officeDocument/2006/relationships" xmlns:p="http://schemas.openxmlformats.org/presentationml/2006/main">
+  <p:cSld>
+    <p:spTree>
+      <p:nvGrpSpPr>
+        <p:cNvPr id="1" name=""/>
+        <p:cNvGrpSpPr/>
+        <p:nvPr/>
+      </p:nvGrpSpPr>
+      <p:grpSpPr>
+        <a:xfrm>
+          <a:off x="0" y="0"/>
+          <a:ext cx="0" cy="0"/>
+          <a:chOff x="0" y="0"/>
+          <a:chExt cx="0" cy="0"/>
+        </a:xfrm>
+      </p:grpSpPr>
+      <p:sp>
+        <p:nvSpPr>
           <p:cNvPr id="52" name="Rectangle : coins arrondis 51">
             <a:extLst>
               <a:ext uri="{FF2B5EF4-FFF2-40B4-BE49-F238E27FC236}">
@@ -8275,6 +11509,9 @@
           <a:prstGeom prst="roundRect">
             <a:avLst/>
           </a:prstGeom>
+          <a:solidFill>
+            <a:srgbClr val="ED7D31"/>
+          </a:solidFill>
         </p:spPr>
         <p:style>
           <a:lnRef idx="2">
@@ -8324,6 +11561,9 @@
           <a:prstGeom prst="roundRect">
             <a:avLst/>
           </a:prstGeom>
+          <a:solidFill>
+            <a:srgbClr val="ED7D31"/>
+          </a:solidFill>
         </p:spPr>
         <p:style>
           <a:lnRef idx="2">
@@ -8530,6 +11770,9 @@
           <a:prstGeom prst="roundRect">
             <a:avLst/>
           </a:prstGeom>
+          <a:solidFill>
+            <a:srgbClr val="ED7D31"/>
+          </a:solidFill>
         </p:spPr>
         <p:style>
           <a:lnRef idx="2">
@@ -8579,6 +11822,9 @@
           <a:prstGeom prst="roundRect">
             <a:avLst/>
           </a:prstGeom>
+          <a:solidFill>
+            <a:srgbClr val="ED7D31"/>
+          </a:solidFill>
         </p:spPr>
         <p:style>
           <a:lnRef idx="2">
@@ -13371,7 +16617,7 @@
 </p:sld>
 </file>
 
-<file path=ppt/slides/slide4.xml><?xml version="1.0" encoding="utf-8"?>
+<file path=ppt/slides/slide6.xml><?xml version="1.0" encoding="utf-8"?>
 <p:sld xmlns:a="http://schemas.openxmlformats.org/drawingml/2006/main" xmlns:r="http://schemas.openxmlformats.org/officeDocument/2006/relationships" xmlns:p="http://schemas.openxmlformats.org/presentationml/2006/main">
   <p:cSld>
     <p:spTree>

</xml_diff>